<commit_message>
Erstellung Orders DbTable und Eintragen in Datenbank bei Bestellung absenden
</commit_message>
<xml_diff>
--- a/Dokumente/Sprint-Backlog/Sprint-Backlog2.pptx
+++ b/Dokumente/Sprint-Backlog/Sprint-Backlog2.pptx
@@ -209,7 +209,7 @@
           <a:p>
             <a:fld id="{7628164F-130E-49E7-B4EA-740541215FF9}" type="datetimeFigureOut">
               <a:rPr lang="de-DE" smtClean="0"/>
-              <a:t>10.12.2024</a:t>
+              <a:t>11.12.2024</a:t>
             </a:fld>
             <a:endParaRPr lang="de-DE"/>
           </a:p>
@@ -623,7 +623,7 @@
           <a:p>
             <a:fld id="{EFF128A2-C7E8-4B7B-8091-9AC752F728F8}" type="datetime1">
               <a:rPr lang="de-DE" smtClean="0"/>
-              <a:t>10.12.2024</a:t>
+              <a:t>11.12.2024</a:t>
             </a:fld>
             <a:endParaRPr lang="en-US"/>
           </a:p>
@@ -821,7 +821,7 @@
           <a:p>
             <a:fld id="{CD278108-7565-4086-A563-4BA2E64958FD}" type="datetime1">
               <a:rPr lang="de-DE" smtClean="0"/>
-              <a:t>10.12.2024</a:t>
+              <a:t>11.12.2024</a:t>
             </a:fld>
             <a:endParaRPr lang="en-US"/>
           </a:p>
@@ -1029,7 +1029,7 @@
           <a:p>
             <a:fld id="{E66CCB26-F45E-4B69-82BE-D569C28446C1}" type="datetime1">
               <a:rPr lang="de-DE" smtClean="0"/>
-              <a:t>10.12.2024</a:t>
+              <a:t>11.12.2024</a:t>
             </a:fld>
             <a:endParaRPr lang="en-US"/>
           </a:p>
@@ -1233,7 +1233,7 @@
           <a:p>
             <a:fld id="{42B45B56-1D88-4042-8DF0-EB6B41B710D3}" type="datetime1">
               <a:rPr lang="de-DE" smtClean="0"/>
-              <a:t>10.12.2024</a:t>
+              <a:t>11.12.2024</a:t>
             </a:fld>
             <a:endParaRPr lang="en-US"/>
           </a:p>
@@ -1508,7 +1508,7 @@
           <a:p>
             <a:fld id="{63213392-7725-4DB0-A75F-BB511BA574DC}" type="datetime1">
               <a:rPr lang="de-DE" smtClean="0"/>
-              <a:t>10.12.2024</a:t>
+              <a:t>11.12.2024</a:t>
             </a:fld>
             <a:endParaRPr lang="en-US"/>
           </a:p>
@@ -1773,7 +1773,7 @@
           <a:p>
             <a:fld id="{12AE7323-5CDD-4051-9975-1729D84443C7}" type="datetime1">
               <a:rPr lang="de-DE" smtClean="0"/>
-              <a:t>10.12.2024</a:t>
+              <a:t>11.12.2024</a:t>
             </a:fld>
             <a:endParaRPr lang="en-US"/>
           </a:p>
@@ -2185,7 +2185,7 @@
           <a:p>
             <a:fld id="{75919FF8-1369-4F22-8739-0971D22D8076}" type="datetime1">
               <a:rPr lang="de-DE" smtClean="0"/>
-              <a:t>10.12.2024</a:t>
+              <a:t>11.12.2024</a:t>
             </a:fld>
             <a:endParaRPr lang="en-US"/>
           </a:p>
@@ -2326,7 +2326,7 @@
           <a:p>
             <a:fld id="{07445AF5-82F2-43C2-816E-A9BEF34D89B7}" type="datetime1">
               <a:rPr lang="de-DE" smtClean="0"/>
-              <a:t>10.12.2024</a:t>
+              <a:t>11.12.2024</a:t>
             </a:fld>
             <a:endParaRPr lang="en-US"/>
           </a:p>
@@ -2439,7 +2439,7 @@
           <a:p>
             <a:fld id="{84700FD4-A8C8-481E-B7C9-06459B544445}" type="datetime1">
               <a:rPr lang="de-DE" smtClean="0"/>
-              <a:t>10.12.2024</a:t>
+              <a:t>11.12.2024</a:t>
             </a:fld>
             <a:endParaRPr lang="en-US"/>
           </a:p>
@@ -2751,7 +2751,7 @@
           <a:p>
             <a:fld id="{225DF808-C4B8-42BA-B4B9-08D42756061A}" type="datetime1">
               <a:rPr lang="de-DE" smtClean="0"/>
-              <a:t>10.12.2024</a:t>
+              <a:t>11.12.2024</a:t>
             </a:fld>
             <a:endParaRPr lang="en-US"/>
           </a:p>
@@ -3042,7 +3042,7 @@
           <a:p>
             <a:fld id="{C36BBF2E-DB4C-4E4C-81C8-BB88CDC14250}" type="datetime1">
               <a:rPr lang="de-DE" smtClean="0"/>
-              <a:t>10.12.2024</a:t>
+              <a:t>11.12.2024</a:t>
             </a:fld>
             <a:endParaRPr lang="en-US"/>
           </a:p>
@@ -3797,7 +3797,7 @@
           <a:p>
             <a:fld id="{7C1C68C6-DBC0-4157-B769-7CB85FE6437C}" type="datetime1">
               <a:rPr lang="de-DE" smtClean="0"/>
-              <a:t>10.12.2024</a:t>
+              <a:t>11.12.2024</a:t>
             </a:fld>
             <a:endParaRPr lang="en-US" dirty="0"/>
           </a:p>
@@ -5096,7 +5096,7 @@
           <a:p>
             <a:fld id="{42B45B56-1D88-4042-8DF0-EB6B41B710D3}" type="datetime1">
               <a:rPr lang="de-DE" noProof="0" smtClean="0"/>
-              <a:t>10.12.2024</a:t>
+              <a:t>11.12.2024</a:t>
             </a:fld>
             <a:endParaRPr lang="de-DE" noProof="0" dirty="0"/>
           </a:p>
@@ -5332,7 +5332,7 @@
           <a:p>
             <a:fld id="{42B45B56-1D88-4042-8DF0-EB6B41B710D3}" type="datetime1">
               <a:rPr lang="de-DE" noProof="0" smtClean="0"/>
-              <a:t>10.12.2024</a:t>
+              <a:t>11.12.2024</a:t>
             </a:fld>
             <a:endParaRPr lang="de-DE" noProof="0" dirty="0"/>
           </a:p>
@@ -5495,7 +5495,7 @@
           <a:p>
             <a:fld id="{12AE7323-5CDD-4051-9975-1729D84443C7}" type="datetime1">
               <a:rPr lang="de-DE" noProof="0" smtClean="0"/>
-              <a:t>10.12.2024</a:t>
+              <a:t>11.12.2024</a:t>
             </a:fld>
             <a:endParaRPr lang="de-DE" noProof="0" dirty="0"/>
           </a:p>
@@ -5667,7 +5667,7 @@
                 <a:tabLst/>
                 <a:defRPr/>
               </a:pPr>
-              <a:t>10.12.2024</a:t>
+              <a:t>11.12.2024</a:t>
             </a:fld>
             <a:endParaRPr kumimoji="0" lang="de-DE" sz="1200" b="0" i="0" u="none" strike="noStrike" kern="1200" cap="none" spc="0" normalizeH="0" baseline="0" noProof="0" dirty="0">
               <a:ln>
@@ -6672,7 +6672,7 @@
           <a:p>
             <a:fld id="{AE5E781B-AB27-45A9-B2F3-7F70593BE83B}" type="datetime1">
               <a:rPr lang="de-DE" noProof="0" smtClean="0"/>
-              <a:t>10.12.2024</a:t>
+              <a:t>11.12.2024</a:t>
             </a:fld>
             <a:endParaRPr lang="de-DE" noProof="0" dirty="0"/>
           </a:p>
@@ -7444,7 +7444,7 @@
           <a:p>
             <a:fld id="{42B45B56-1D88-4042-8DF0-EB6B41B710D3}" type="datetime1">
               <a:rPr lang="de-DE" noProof="0" smtClean="0"/>
-              <a:t>10.12.2024</a:t>
+              <a:t>11.12.2024</a:t>
             </a:fld>
             <a:endParaRPr lang="de-DE" noProof="0" dirty="0"/>
           </a:p>
@@ -7590,7 +7590,7 @@
           <a:p>
             <a:fld id="{42B45B56-1D88-4042-8DF0-EB6B41B710D3}" type="datetime1">
               <a:rPr lang="de-DE" noProof="0" smtClean="0"/>
-              <a:t>10.12.2024</a:t>
+              <a:t>11.12.2024</a:t>
             </a:fld>
             <a:endParaRPr lang="de-DE" noProof="0" dirty="0"/>
           </a:p>
@@ -7712,7 +7712,7 @@
           <a:p>
             <a:fld id="{42B45B56-1D88-4042-8DF0-EB6B41B710D3}" type="datetime1">
               <a:rPr lang="de-DE" noProof="0" smtClean="0"/>
-              <a:t>10.12.2024</a:t>
+              <a:t>11.12.2024</a:t>
             </a:fld>
             <a:endParaRPr lang="de-DE" noProof="0" dirty="0"/>
           </a:p>
@@ -7763,7 +7763,7 @@
             <p:ph idx="1"/>
             <p:extLst>
               <p:ext uri="{D42A27DB-BD31-4B8C-83A1-F6EECF244321}">
-                <p14:modId xmlns:p14="http://schemas.microsoft.com/office/powerpoint/2010/main" val="3875702723"/>
+                <p14:modId xmlns:p14="http://schemas.microsoft.com/office/powerpoint/2010/main" val="889857114"/>
               </p:ext>
             </p:extLst>
           </p:nvPr>
@@ -7901,7 +7901,7 @@
                     <a:p>
                       <a:r>
                         <a:rPr lang="de-DE" sz="1400" noProof="0" dirty="0"/>
-                        <a:t>18</a:t>
+                        <a:t>12</a:t>
                       </a:r>
                     </a:p>
                   </a:txBody>
@@ -7979,7 +7979,7 @@
                     <a:lstStyle/>
                     <a:p>
                       <a:r>
-                        <a:rPr lang="de-DE" sz="1400" kern="1200" noProof="0" dirty="0">
+                        <a:rPr lang="en-US" sz="1400" kern="1200" noProof="0" dirty="0">
                           <a:solidFill>
                             <a:schemeClr val="dk1"/>
                           </a:solidFill>
@@ -7987,8 +7987,16 @@
                           <a:ea typeface="+mn-ea"/>
                           <a:cs typeface="+mn-cs"/>
                         </a:rPr>
-                        <a:t>2</a:t>
+                        <a:t>4</a:t>
                       </a:r>
+                      <a:endParaRPr lang="de-DE" sz="1400" kern="1200" noProof="0" dirty="0">
+                        <a:solidFill>
+                          <a:schemeClr val="dk1"/>
+                        </a:solidFill>
+                        <a:latin typeface="+mn-lt"/>
+                        <a:ea typeface="+mn-ea"/>
+                        <a:cs typeface="+mn-cs"/>
+                      </a:endParaRPr>
                     </a:p>
                   </a:txBody>
                   <a:tcPr/>
@@ -8088,7 +8096,7 @@
                     <a:p>
                       <a:r>
                         <a:rPr lang="de-DE" sz="1400" noProof="0" dirty="0"/>
-                        <a:t>Erledigt</a:t>
+                        <a:t>In Arbeit</a:t>
                       </a:r>
                     </a:p>
                   </a:txBody>
@@ -8448,7 +8456,7 @@
           <a:p>
             <a:fld id="{42B45B56-1D88-4042-8DF0-EB6B41B710D3}" type="datetime1">
               <a:rPr lang="de-DE" noProof="0" smtClean="0"/>
-              <a:t>10.12.2024</a:t>
+              <a:t>11.12.2024</a:t>
             </a:fld>
             <a:endParaRPr lang="de-DE" noProof="0" dirty="0"/>
           </a:p>
@@ -8669,7 +8677,7 @@
           <a:p>
             <a:fld id="{42B45B56-1D88-4042-8DF0-EB6B41B710D3}" type="datetime1">
               <a:rPr lang="de-DE" noProof="0" smtClean="0"/>
-              <a:t>10.12.2024</a:t>
+              <a:t>11.12.2024</a:t>
             </a:fld>
             <a:endParaRPr lang="de-DE" noProof="0" dirty="0"/>
           </a:p>
@@ -9233,7 +9241,7 @@
           <a:p>
             <a:fld id="{42B45B56-1D88-4042-8DF0-EB6B41B710D3}" type="datetime1">
               <a:rPr lang="de-DE" noProof="0" smtClean="0"/>
-              <a:t>10.12.2024</a:t>
+              <a:t>11.12.2024</a:t>
             </a:fld>
             <a:endParaRPr lang="de-DE" noProof="0" dirty="0"/>
           </a:p>
@@ -9612,55 +9620,6 @@
           </a:graphicData>
         </a:graphic>
       </p:graphicFrame>
-      <p:sp>
-        <p:nvSpPr>
-          <p:cNvPr id="3" name="Gewitterblitz 2">
-            <a:extLst>
-              <a:ext uri="{FF2B5EF4-FFF2-40B4-BE49-F238E27FC236}">
-                <a16:creationId xmlns:a16="http://schemas.microsoft.com/office/drawing/2014/main" id="{7C02CA7B-6441-3EED-23C9-16C3E26D9C3D}"/>
-              </a:ext>
-            </a:extLst>
-          </p:cNvPr>
-          <p:cNvSpPr/>
-          <p:nvPr/>
-        </p:nvSpPr>
-        <p:spPr>
-          <a:xfrm rot="3267422">
-            <a:off x="9647582" y="3597330"/>
-            <a:ext cx="1524000" cy="2936240"/>
-          </a:xfrm>
-          <a:prstGeom prst="lightningBolt">
-            <a:avLst/>
-          </a:prstGeom>
-          <a:solidFill>
-            <a:srgbClr val="FFC000"/>
-          </a:solidFill>
-        </p:spPr>
-        <p:style>
-          <a:lnRef idx="2">
-            <a:schemeClr val="accent1">
-              <a:shade val="15000"/>
-            </a:schemeClr>
-          </a:lnRef>
-          <a:fillRef idx="1">
-            <a:schemeClr val="accent1"/>
-          </a:fillRef>
-          <a:effectRef idx="0">
-            <a:schemeClr val="accent1"/>
-          </a:effectRef>
-          <a:fontRef idx="minor">
-            <a:schemeClr val="lt1"/>
-          </a:fontRef>
-        </p:style>
-        <p:txBody>
-          <a:bodyPr rtlCol="0" anchor="ctr"/>
-          <a:lstStyle/>
-          <a:p>
-            <a:pPr algn="ctr"/>
-            <a:endParaRPr lang="de-DE" noProof="0" dirty="0"/>
-          </a:p>
-        </p:txBody>
-      </p:sp>
     </p:spTree>
     <p:extLst>
       <p:ext uri="{BB962C8B-B14F-4D97-AF65-F5344CB8AC3E}">
@@ -9671,84 +9630,6 @@
   <p:clrMapOvr>
     <a:masterClrMapping/>
   </p:clrMapOvr>
-  <p:timing>
-    <p:tnLst>
-      <p:par>
-        <p:cTn id="1" dur="indefinite" restart="never" nodeType="tmRoot">
-          <p:childTnLst>
-            <p:seq concurrent="1" nextAc="seek">
-              <p:cTn id="2" dur="indefinite" nodeType="mainSeq">
-                <p:childTnLst>
-                  <p:par>
-                    <p:cTn id="3" fill="hold">
-                      <p:stCondLst>
-                        <p:cond delay="indefinite"/>
-                      </p:stCondLst>
-                      <p:childTnLst>
-                        <p:par>
-                          <p:cTn id="4" fill="hold">
-                            <p:stCondLst>
-                              <p:cond delay="0"/>
-                            </p:stCondLst>
-                            <p:childTnLst>
-                              <p:par>
-                                <p:cTn id="5" presetID="1" presetClass="entr" presetSubtype="0" fill="hold" grpId="0" nodeType="clickEffect">
-                                  <p:stCondLst>
-                                    <p:cond delay="0"/>
-                                  </p:stCondLst>
-                                  <p:childTnLst>
-                                    <p:set>
-                                      <p:cBhvr>
-                                        <p:cTn id="6" dur="1" fill="hold">
-                                          <p:stCondLst>
-                                            <p:cond delay="0"/>
-                                          </p:stCondLst>
-                                        </p:cTn>
-                                        <p:tgtEl>
-                                          <p:spTgt spid="3"/>
-                                        </p:tgtEl>
-                                        <p:attrNameLst>
-                                          <p:attrName>style.visibility</p:attrName>
-                                        </p:attrNameLst>
-                                      </p:cBhvr>
-                                      <p:to>
-                                        <p:strVal val="visible"/>
-                                      </p:to>
-                                    </p:set>
-                                  </p:childTnLst>
-                                </p:cTn>
-                              </p:par>
-                            </p:childTnLst>
-                          </p:cTn>
-                        </p:par>
-                      </p:childTnLst>
-                    </p:cTn>
-                  </p:par>
-                </p:childTnLst>
-              </p:cTn>
-              <p:prevCondLst>
-                <p:cond evt="onPrev" delay="0">
-                  <p:tgtEl>
-                    <p:sldTgt/>
-                  </p:tgtEl>
-                </p:cond>
-              </p:prevCondLst>
-              <p:nextCondLst>
-                <p:cond evt="onNext" delay="0">
-                  <p:tgtEl>
-                    <p:sldTgt/>
-                  </p:tgtEl>
-                </p:cond>
-              </p:nextCondLst>
-            </p:seq>
-          </p:childTnLst>
-        </p:cTn>
-      </p:par>
-    </p:tnLst>
-    <p:bldLst>
-      <p:bldP spid="3" grpId="0" animBg="1"/>
-    </p:bldLst>
-  </p:timing>
 </p:sld>
 </file>
 
@@ -9879,7 +9760,7 @@
           <a:p>
             <a:fld id="{42B45B56-1D88-4042-8DF0-EB6B41B710D3}" type="datetime1">
               <a:rPr lang="de-DE" noProof="0" smtClean="0"/>
-              <a:t>10.12.2024</a:t>
+              <a:t>11.12.2024</a:t>
             </a:fld>
             <a:endParaRPr lang="de-DE" noProof="0" dirty="0"/>
           </a:p>

</xml_diff>

<commit_message>
Input "IT"-Abteilung Für PP
</commit_message>
<xml_diff>
--- a/Dokumente/Sprint-Backlog/Sprint-Backlog2.pptx
+++ b/Dokumente/Sprint-Backlog/Sprint-Backlog2.pptx
@@ -19,12 +19,12 @@
     <p:sldId id="280" r:id="rId10"/>
     <p:sldId id="278" r:id="rId11"/>
     <p:sldId id="267" r:id="rId12"/>
-    <p:sldId id="270" r:id="rId13"/>
-    <p:sldId id="262" r:id="rId14"/>
-    <p:sldId id="263" r:id="rId15"/>
-    <p:sldId id="264" r:id="rId16"/>
-    <p:sldId id="275" r:id="rId17"/>
-    <p:sldId id="274" r:id="rId18"/>
+    <p:sldId id="284" r:id="rId13"/>
+    <p:sldId id="270" r:id="rId14"/>
+    <p:sldId id="262" r:id="rId15"/>
+    <p:sldId id="263" r:id="rId16"/>
+    <p:sldId id="264" r:id="rId17"/>
+    <p:sldId id="275" r:id="rId18"/>
   </p:sldIdLst>
   <p:sldSz cx="12192000" cy="6858000"/>
   <p:notesSz cx="6858000" cy="9144000"/>
@@ -540,7 +540,7 @@
           <a:p>
             <a:fld id="{7628164F-130E-49E7-B4EA-740541215FF9}" type="datetimeFigureOut">
               <a:rPr lang="de-DE" smtClean="0"/>
-              <a:t>11.12.2024</a:t>
+              <a:t>12.12.2024</a:t>
             </a:fld>
             <a:endParaRPr lang="de-DE"/>
           </a:p>
@@ -807,6 +807,90 @@
 </p:notesMaster>
 </file>
 
+<file path=ppt/notesSlides/notesSlide1.xml><?xml version="1.0" encoding="utf-8"?>
+<p:notes xmlns:a="http://schemas.openxmlformats.org/drawingml/2006/main" xmlns:r="http://schemas.openxmlformats.org/officeDocument/2006/relationships" xmlns:p="http://schemas.openxmlformats.org/presentationml/2006/main">
+  <p:cSld>
+    <p:spTree>
+      <p:nvGrpSpPr>
+        <p:cNvPr id="1" name=""/>
+        <p:cNvGrpSpPr/>
+        <p:nvPr/>
+      </p:nvGrpSpPr>
+      <p:grpSpPr>
+        <a:xfrm>
+          <a:off x="0" y="0"/>
+          <a:ext cx="0" cy="0"/>
+          <a:chOff x="0" y="0"/>
+          <a:chExt cx="0" cy="0"/>
+        </a:xfrm>
+      </p:grpSpPr>
+      <p:sp>
+        <p:nvSpPr>
+          <p:cNvPr id="2" name="Folienbildplatzhalter 1"/>
+          <p:cNvSpPr>
+            <a:spLocks noGrp="1" noRot="1" noChangeAspect="1"/>
+          </p:cNvSpPr>
+          <p:nvPr>
+            <p:ph type="sldImg"/>
+          </p:nvPr>
+        </p:nvSpPr>
+        <p:spPr/>
+      </p:sp>
+      <p:sp>
+        <p:nvSpPr>
+          <p:cNvPr id="3" name="Notizenplatzhalter 2"/>
+          <p:cNvSpPr>
+            <a:spLocks noGrp="1"/>
+          </p:cNvSpPr>
+          <p:nvPr>
+            <p:ph type="body" idx="1"/>
+          </p:nvPr>
+        </p:nvSpPr>
+        <p:spPr/>
+        <p:txBody>
+          <a:bodyPr/>
+          <a:lstStyle/>
+          <a:p>
+            <a:endParaRPr lang="de-DE" dirty="0"/>
+          </a:p>
+        </p:txBody>
+      </p:sp>
+      <p:sp>
+        <p:nvSpPr>
+          <p:cNvPr id="4" name="Foliennummernplatzhalter 3"/>
+          <p:cNvSpPr>
+            <a:spLocks noGrp="1"/>
+          </p:cNvSpPr>
+          <p:nvPr>
+            <p:ph type="sldNum" sz="quarter" idx="5"/>
+          </p:nvPr>
+        </p:nvSpPr>
+        <p:spPr/>
+        <p:txBody>
+          <a:bodyPr/>
+          <a:lstStyle/>
+          <a:p>
+            <a:fld id="{B8062E93-4410-40F6-8AB9-119AC591FA0D}" type="slidenum">
+              <a:rPr lang="de-DE" smtClean="0"/>
+              <a:t>4</a:t>
+            </a:fld>
+            <a:endParaRPr lang="de-DE"/>
+          </a:p>
+        </p:txBody>
+      </p:sp>
+    </p:spTree>
+    <p:extLst>
+      <p:ext uri="{BB962C8B-B14F-4D97-AF65-F5344CB8AC3E}">
+        <p14:creationId xmlns:p14="http://schemas.microsoft.com/office/powerpoint/2010/main" val="2391993516"/>
+      </p:ext>
+    </p:extLst>
+  </p:cSld>
+  <p:clrMapOvr>
+    <a:masterClrMapping/>
+  </p:clrMapOvr>
+</p:notes>
+</file>
+
 <file path=ppt/slideLayouts/slideLayout1.xml><?xml version="1.0" encoding="utf-8"?>
 <p:sldLayout xmlns:a="http://schemas.openxmlformats.org/drawingml/2006/main" xmlns:r="http://schemas.openxmlformats.org/officeDocument/2006/relationships" xmlns:p="http://schemas.openxmlformats.org/presentationml/2006/main" type="title" preserve="1">
   <p:cSld name="Title Slide">
@@ -954,7 +1038,7 @@
           <a:p>
             <a:fld id="{EFF128A2-C7E8-4B7B-8091-9AC752F728F8}" type="datetime1">
               <a:rPr lang="de-DE" smtClean="0"/>
-              <a:t>11.12.2024</a:t>
+              <a:t>12.12.2024</a:t>
             </a:fld>
             <a:endParaRPr lang="en-US"/>
           </a:p>
@@ -1152,7 +1236,7 @@
           <a:p>
             <a:fld id="{CD278108-7565-4086-A563-4BA2E64958FD}" type="datetime1">
               <a:rPr lang="de-DE" smtClean="0"/>
-              <a:t>11.12.2024</a:t>
+              <a:t>12.12.2024</a:t>
             </a:fld>
             <a:endParaRPr lang="en-US"/>
           </a:p>
@@ -1360,7 +1444,7 @@
           <a:p>
             <a:fld id="{E66CCB26-F45E-4B69-82BE-D569C28446C1}" type="datetime1">
               <a:rPr lang="de-DE" smtClean="0"/>
-              <a:t>11.12.2024</a:t>
+              <a:t>12.12.2024</a:t>
             </a:fld>
             <a:endParaRPr lang="en-US"/>
           </a:p>
@@ -1564,7 +1648,7 @@
           <a:p>
             <a:fld id="{42B45B56-1D88-4042-8DF0-EB6B41B710D3}" type="datetime1">
               <a:rPr lang="de-DE" smtClean="0"/>
-              <a:t>11.12.2024</a:t>
+              <a:t>12.12.2024</a:t>
             </a:fld>
             <a:endParaRPr lang="en-US"/>
           </a:p>
@@ -1839,7 +1923,7 @@
           <a:p>
             <a:fld id="{63213392-7725-4DB0-A75F-BB511BA574DC}" type="datetime1">
               <a:rPr lang="de-DE" smtClean="0"/>
-              <a:t>11.12.2024</a:t>
+              <a:t>12.12.2024</a:t>
             </a:fld>
             <a:endParaRPr lang="en-US"/>
           </a:p>
@@ -2104,7 +2188,7 @@
           <a:p>
             <a:fld id="{12AE7323-5CDD-4051-9975-1729D84443C7}" type="datetime1">
               <a:rPr lang="de-DE" smtClean="0"/>
-              <a:t>11.12.2024</a:t>
+              <a:t>12.12.2024</a:t>
             </a:fld>
             <a:endParaRPr lang="en-US"/>
           </a:p>
@@ -2516,7 +2600,7 @@
           <a:p>
             <a:fld id="{75919FF8-1369-4F22-8739-0971D22D8076}" type="datetime1">
               <a:rPr lang="de-DE" smtClean="0"/>
-              <a:t>11.12.2024</a:t>
+              <a:t>12.12.2024</a:t>
             </a:fld>
             <a:endParaRPr lang="en-US"/>
           </a:p>
@@ -2657,7 +2741,7 @@
           <a:p>
             <a:fld id="{07445AF5-82F2-43C2-816E-A9BEF34D89B7}" type="datetime1">
               <a:rPr lang="de-DE" smtClean="0"/>
-              <a:t>11.12.2024</a:t>
+              <a:t>12.12.2024</a:t>
             </a:fld>
             <a:endParaRPr lang="en-US"/>
           </a:p>
@@ -2770,7 +2854,7 @@
           <a:p>
             <a:fld id="{84700FD4-A8C8-481E-B7C9-06459B544445}" type="datetime1">
               <a:rPr lang="de-DE" smtClean="0"/>
-              <a:t>11.12.2024</a:t>
+              <a:t>12.12.2024</a:t>
             </a:fld>
             <a:endParaRPr lang="en-US"/>
           </a:p>
@@ -3082,7 +3166,7 @@
           <a:p>
             <a:fld id="{225DF808-C4B8-42BA-B4B9-08D42756061A}" type="datetime1">
               <a:rPr lang="de-DE" smtClean="0"/>
-              <a:t>11.12.2024</a:t>
+              <a:t>12.12.2024</a:t>
             </a:fld>
             <a:endParaRPr lang="en-US"/>
           </a:p>
@@ -3373,7 +3457,7 @@
           <a:p>
             <a:fld id="{C36BBF2E-DB4C-4E4C-81C8-BB88CDC14250}" type="datetime1">
               <a:rPr lang="de-DE" smtClean="0"/>
-              <a:t>11.12.2024</a:t>
+              <a:t>12.12.2024</a:t>
             </a:fld>
             <a:endParaRPr lang="en-US"/>
           </a:p>
@@ -4128,7 +4212,7 @@
           <a:p>
             <a:fld id="{7C1C68C6-DBC0-4157-B769-7CB85FE6437C}" type="datetime1">
               <a:rPr lang="de-DE" smtClean="0"/>
-              <a:t>11.12.2024</a:t>
+              <a:t>12.12.2024</a:t>
             </a:fld>
             <a:endParaRPr lang="en-US" dirty="0"/>
           </a:p>
@@ -5299,8 +5383,8 @@
         </p:blipFill>
         <p:spPr>
           <a:xfrm>
-            <a:off x="1636826" y="2619375"/>
-            <a:ext cx="3401786" cy="3143250"/>
+            <a:off x="5601271" y="3148497"/>
+            <a:ext cx="2787611" cy="2575752"/>
           </a:xfrm>
         </p:spPr>
       </p:pic>
@@ -5322,14 +5406,13 @@
         </p:nvPicPr>
         <p:blipFill>
           <a:blip r:embed="rId3"/>
-          <a:stretch>
-            <a:fillRect/>
-          </a:stretch>
+          <a:srcRect l="11932"/>
+          <a:stretch/>
         </p:blipFill>
         <p:spPr>
           <a:xfrm>
-            <a:off x="7429269" y="2025650"/>
-            <a:ext cx="2850024" cy="4330700"/>
+            <a:off x="1636826" y="2074746"/>
+            <a:ext cx="2509961" cy="4330700"/>
           </a:xfrm>
         </p:spPr>
       </p:pic>
@@ -5356,7 +5439,7 @@
           <a:p>
             <a:fld id="{12AE7323-5CDD-4051-9975-1729D84443C7}" type="datetime1">
               <a:rPr lang="de-DE" smtClean="0"/>
-              <a:t>11.12.2024</a:t>
+              <a:t>12.12.2024</a:t>
             </a:fld>
             <a:endParaRPr lang="en-US"/>
           </a:p>
@@ -5450,7 +5533,7 @@
           <a:p>
             <a:r>
               <a:rPr lang="de-DE" noProof="0" dirty="0"/>
-              <a:t>4. Detailplanung ??</a:t>
+              <a:t>4. Detailplanung – Sprint 2</a:t>
             </a:r>
           </a:p>
         </p:txBody>
@@ -5478,7 +5561,7 @@
           <a:p>
             <a:fld id="{42B45B56-1D88-4042-8DF0-EB6B41B710D3}" type="datetime1">
               <a:rPr lang="de-DE" noProof="0" smtClean="0"/>
-              <a:t>11.12.2024</a:t>
+              <a:t>12.12.2024</a:t>
             </a:fld>
             <a:endParaRPr lang="de-DE" noProof="0" dirty="0"/>
           </a:p>
@@ -6231,6 +6314,819 @@
         <p:cNvPr id="1" name="">
           <a:extLst>
             <a:ext uri="{FF2B5EF4-FFF2-40B4-BE49-F238E27FC236}">
+              <a16:creationId xmlns:a16="http://schemas.microsoft.com/office/drawing/2014/main" id="{E7387E4F-8F8B-549F-9E8B-A6D23B79874A}"/>
+            </a:ext>
+          </a:extLst>
+        </p:cNvPr>
+        <p:cNvGrpSpPr/>
+        <p:nvPr/>
+      </p:nvGrpSpPr>
+      <p:grpSpPr>
+        <a:xfrm>
+          <a:off x="0" y="0"/>
+          <a:ext cx="0" cy="0"/>
+          <a:chOff x="0" y="0"/>
+          <a:chExt cx="0" cy="0"/>
+        </a:xfrm>
+      </p:grpSpPr>
+      <p:sp>
+        <p:nvSpPr>
+          <p:cNvPr id="2" name="Titel 1">
+            <a:extLst>
+              <a:ext uri="{FF2B5EF4-FFF2-40B4-BE49-F238E27FC236}">
+                <a16:creationId xmlns:a16="http://schemas.microsoft.com/office/drawing/2014/main" id="{D58430E9-F122-BB4D-42D9-7C8292E55FE0}"/>
+              </a:ext>
+            </a:extLst>
+          </p:cNvPr>
+          <p:cNvSpPr>
+            <a:spLocks noGrp="1"/>
+          </p:cNvSpPr>
+          <p:nvPr>
+            <p:ph type="title"/>
+          </p:nvPr>
+        </p:nvSpPr>
+        <p:spPr/>
+        <p:txBody>
+          <a:bodyPr/>
+          <a:lstStyle/>
+          <a:p>
+            <a:r>
+              <a:rPr lang="de-DE" noProof="0" dirty="0"/>
+              <a:t>4. Detailplanung – Sprint 3</a:t>
+            </a:r>
+          </a:p>
+        </p:txBody>
+      </p:sp>
+      <p:sp>
+        <p:nvSpPr>
+          <p:cNvPr id="4" name="Datumsplatzhalter 3">
+            <a:extLst>
+              <a:ext uri="{FF2B5EF4-FFF2-40B4-BE49-F238E27FC236}">
+                <a16:creationId xmlns:a16="http://schemas.microsoft.com/office/drawing/2014/main" id="{7E07A518-0A76-4F7C-7D6C-4A88EB592E30}"/>
+              </a:ext>
+            </a:extLst>
+          </p:cNvPr>
+          <p:cNvSpPr>
+            <a:spLocks noGrp="1"/>
+          </p:cNvSpPr>
+          <p:nvPr>
+            <p:ph type="dt" sz="half" idx="10"/>
+          </p:nvPr>
+        </p:nvSpPr>
+        <p:spPr/>
+        <p:txBody>
+          <a:bodyPr/>
+          <a:lstStyle/>
+          <a:p>
+            <a:fld id="{42B45B56-1D88-4042-8DF0-EB6B41B710D3}" type="datetime1">
+              <a:rPr lang="de-DE" noProof="0" smtClean="0"/>
+              <a:t>12.12.2024</a:t>
+            </a:fld>
+            <a:endParaRPr lang="de-DE" noProof="0" dirty="0"/>
+          </a:p>
+        </p:txBody>
+      </p:sp>
+      <p:sp>
+        <p:nvSpPr>
+          <p:cNvPr id="5" name="Foliennummernplatzhalter 4">
+            <a:extLst>
+              <a:ext uri="{FF2B5EF4-FFF2-40B4-BE49-F238E27FC236}">
+                <a16:creationId xmlns:a16="http://schemas.microsoft.com/office/drawing/2014/main" id="{63B4E9A9-C2F5-9B15-881B-C1199172F9BD}"/>
+              </a:ext>
+            </a:extLst>
+          </p:cNvPr>
+          <p:cNvSpPr>
+            <a:spLocks noGrp="1"/>
+          </p:cNvSpPr>
+          <p:nvPr>
+            <p:ph type="sldNum" sz="quarter" idx="12"/>
+          </p:nvPr>
+        </p:nvSpPr>
+        <p:spPr/>
+        <p:txBody>
+          <a:bodyPr/>
+          <a:lstStyle/>
+          <a:p>
+            <a:fld id="{07CE569E-9B7C-4CB9-AB80-C0841F922CFF}" type="slidenum">
+              <a:rPr lang="de-DE" noProof="0" smtClean="0"/>
+              <a:t>12</a:t>
+            </a:fld>
+            <a:endParaRPr lang="de-DE" noProof="0" dirty="0"/>
+          </a:p>
+        </p:txBody>
+      </p:sp>
+      <p:pic>
+        <p:nvPicPr>
+          <p:cNvPr id="7" name="Grafik 6">
+            <a:extLst>
+              <a:ext uri="{FF2B5EF4-FFF2-40B4-BE49-F238E27FC236}">
+                <a16:creationId xmlns:a16="http://schemas.microsoft.com/office/drawing/2014/main" id="{ADA2DE47-6451-F57E-7DC7-1D4B0972903F}"/>
+              </a:ext>
+            </a:extLst>
+          </p:cNvPr>
+          <p:cNvPicPr>
+            <a:picLocks noChangeAspect="1"/>
+          </p:cNvPicPr>
+          <p:nvPr/>
+        </p:nvPicPr>
+        <p:blipFill>
+          <a:blip r:embed="rId2"/>
+          <a:stretch>
+            <a:fillRect/>
+          </a:stretch>
+        </p:blipFill>
+        <p:spPr>
+          <a:xfrm>
+            <a:off x="6884925" y="6278906"/>
+            <a:ext cx="1738967" cy="451906"/>
+          </a:xfrm>
+          <a:prstGeom prst="rect">
+            <a:avLst/>
+          </a:prstGeom>
+        </p:spPr>
+      </p:pic>
+      <p:sp>
+        <p:nvSpPr>
+          <p:cNvPr id="12" name="Textfeld 11">
+            <a:extLst>
+              <a:ext uri="{FF2B5EF4-FFF2-40B4-BE49-F238E27FC236}">
+                <a16:creationId xmlns:a16="http://schemas.microsoft.com/office/drawing/2014/main" id="{E2D9E691-1A44-E858-40FD-A687B005B6E5}"/>
+              </a:ext>
+            </a:extLst>
+          </p:cNvPr>
+          <p:cNvSpPr txBox="1"/>
+          <p:nvPr/>
+        </p:nvSpPr>
+        <p:spPr>
+          <a:xfrm>
+            <a:off x="6884925" y="6327056"/>
+            <a:ext cx="1524000" cy="369332"/>
+          </a:xfrm>
+          <a:prstGeom prst="rect">
+            <a:avLst/>
+          </a:prstGeom>
+          <a:noFill/>
+        </p:spPr>
+        <p:txBody>
+          <a:bodyPr wrap="square" rtlCol="0">
+            <a:spAutoFit/>
+          </a:bodyPr>
+          <a:lstStyle/>
+          <a:p>
+            <a:r>
+              <a:rPr lang="de-DE" noProof="0" dirty="0">
+                <a:solidFill>
+                  <a:srgbClr val="FF0000"/>
+                </a:solidFill>
+              </a:rPr>
+              <a:t>Summe  42</a:t>
+            </a:r>
+          </a:p>
+        </p:txBody>
+      </p:sp>
+      <p:graphicFrame>
+        <p:nvGraphicFramePr>
+          <p:cNvPr id="8" name="Inhaltsplatzhalter 2">
+            <a:extLst>
+              <a:ext uri="{FF2B5EF4-FFF2-40B4-BE49-F238E27FC236}">
+                <a16:creationId xmlns:a16="http://schemas.microsoft.com/office/drawing/2014/main" id="{715C4C09-A577-9E60-2D7F-37D0244704E7}"/>
+              </a:ext>
+            </a:extLst>
+          </p:cNvPr>
+          <p:cNvGraphicFramePr>
+            <a:graphicFrameLocks/>
+          </p:cNvGraphicFramePr>
+          <p:nvPr/>
+        </p:nvGraphicFramePr>
+        <p:xfrm>
+          <a:off x="762001" y="1916681"/>
+          <a:ext cx="8902700" cy="4267200"/>
+        </p:xfrm>
+        <a:graphic>
+          <a:graphicData uri="http://schemas.openxmlformats.org/drawingml/2006/table">
+            <a:tbl>
+              <a:tblPr firstRow="1" bandRow="1">
+                <a:tableStyleId>{5C22544A-7EE6-4342-B048-85BDC9FD1C3A}</a:tableStyleId>
+              </a:tblPr>
+              <a:tblGrid>
+                <a:gridCol w="3172001">
+                  <a:extLst>
+                    <a:ext uri="{9D8B030D-6E8A-4147-A177-3AD203B41FA5}">
+                      <a16:colId xmlns:a16="http://schemas.microsoft.com/office/drawing/2014/main" val="230851902"/>
+                    </a:ext>
+                  </a:extLst>
+                </a:gridCol>
+                <a:gridCol w="1932740">
+                  <a:extLst>
+                    <a:ext uri="{9D8B030D-6E8A-4147-A177-3AD203B41FA5}">
+                      <a16:colId xmlns:a16="http://schemas.microsoft.com/office/drawing/2014/main" val="2657664356"/>
+                    </a:ext>
+                  </a:extLst>
+                </a:gridCol>
+                <a:gridCol w="1443224">
+                  <a:extLst>
+                    <a:ext uri="{9D8B030D-6E8A-4147-A177-3AD203B41FA5}">
+                      <a16:colId xmlns:a16="http://schemas.microsoft.com/office/drawing/2014/main" val="4098082685"/>
+                    </a:ext>
+                  </a:extLst>
+                </a:gridCol>
+                <a:gridCol w="1443224">
+                  <a:extLst>
+                    <a:ext uri="{9D8B030D-6E8A-4147-A177-3AD203B41FA5}">
+                      <a16:colId xmlns:a16="http://schemas.microsoft.com/office/drawing/2014/main" val="1293295862"/>
+                    </a:ext>
+                  </a:extLst>
+                </a:gridCol>
+                <a:gridCol w="911511">
+                  <a:extLst>
+                    <a:ext uri="{9D8B030D-6E8A-4147-A177-3AD203B41FA5}">
+                      <a16:colId xmlns:a16="http://schemas.microsoft.com/office/drawing/2014/main" val="2360363224"/>
+                    </a:ext>
+                  </a:extLst>
+                </a:gridCol>
+              </a:tblGrid>
+              <a:tr h="515990">
+                <a:tc>
+                  <a:txBody>
+                    <a:bodyPr/>
+                    <a:lstStyle/>
+                    <a:p>
+                      <a:r>
+                        <a:rPr lang="de-DE" sz="1400" noProof="0" dirty="0"/>
+                        <a:t>Aufgabe</a:t>
+                      </a:r>
+                    </a:p>
+                  </a:txBody>
+                  <a:tcPr/>
+                </a:tc>
+                <a:tc>
+                  <a:txBody>
+                    <a:bodyPr/>
+                    <a:lstStyle/>
+                    <a:p>
+                      <a:r>
+                        <a:rPr lang="de-DE" sz="1400" noProof="0" dirty="0"/>
+                        <a:t>Zuständigkeit</a:t>
+                      </a:r>
+                    </a:p>
+                  </a:txBody>
+                  <a:tcPr/>
+                </a:tc>
+                <a:tc>
+                  <a:txBody>
+                    <a:bodyPr/>
+                    <a:lstStyle/>
+                    <a:p>
+                      <a:r>
+                        <a:rPr lang="de-DE" sz="1400" noProof="0" dirty="0"/>
+                        <a:t>Aufwand geschätzt</a:t>
+                      </a:r>
+                    </a:p>
+                  </a:txBody>
+                  <a:tcPr/>
+                </a:tc>
+                <a:tc>
+                  <a:txBody>
+                    <a:bodyPr/>
+                    <a:lstStyle/>
+                    <a:p>
+                      <a:r>
+                        <a:rPr lang="de-DE" sz="1400" noProof="0" dirty="0"/>
+                        <a:t>Aufwand tatsächlich</a:t>
+                      </a:r>
+                    </a:p>
+                  </a:txBody>
+                  <a:tcPr/>
+                </a:tc>
+                <a:tc>
+                  <a:txBody>
+                    <a:bodyPr/>
+                    <a:lstStyle/>
+                    <a:p>
+                      <a:r>
+                        <a:rPr lang="de-DE" sz="1400" noProof="0" dirty="0"/>
+                        <a:t>Status</a:t>
+                      </a:r>
+                    </a:p>
+                  </a:txBody>
+                  <a:tcPr/>
+                </a:tc>
+                <a:extLst>
+                  <a:ext uri="{0D108BD9-81ED-4DB2-BD59-A6C34878D82A}">
+                    <a16:rowId xmlns:a16="http://schemas.microsoft.com/office/drawing/2014/main" val="2749238170"/>
+                  </a:ext>
+                </a:extLst>
+              </a:tr>
+              <a:tr h="643639">
+                <a:tc>
+                  <a:txBody>
+                    <a:bodyPr/>
+                    <a:lstStyle/>
+                    <a:p>
+                      <a:r>
+                        <a:rPr lang="de-DE" sz="1400" noProof="0" dirty="0"/>
+                        <a:t>Dokumentation + Projekt Management + Architekturdokument</a:t>
+                      </a:r>
+                    </a:p>
+                  </a:txBody>
+                  <a:tcPr/>
+                </a:tc>
+                <a:tc>
+                  <a:txBody>
+                    <a:bodyPr/>
+                    <a:lstStyle/>
+                    <a:p>
+                      <a:r>
+                        <a:rPr lang="de-DE" sz="1400" noProof="0" dirty="0"/>
+                        <a:t>Alle</a:t>
+                      </a:r>
+                    </a:p>
+                  </a:txBody>
+                  <a:tcPr/>
+                </a:tc>
+                <a:tc>
+                  <a:txBody>
+                    <a:bodyPr/>
+                    <a:lstStyle/>
+                    <a:p>
+                      <a:r>
+                        <a:rPr lang="de-DE" sz="1400" noProof="0" dirty="0"/>
+                        <a:t>16</a:t>
+                      </a:r>
+                    </a:p>
+                  </a:txBody>
+                  <a:tcPr/>
+                </a:tc>
+                <a:tc>
+                  <a:txBody>
+                    <a:bodyPr/>
+                    <a:lstStyle/>
+                    <a:p>
+                      <a:r>
+                        <a:rPr lang="de-DE" sz="1400" noProof="0" dirty="0"/>
+                        <a:t>14</a:t>
+                      </a:r>
+                    </a:p>
+                  </a:txBody>
+                  <a:tcPr/>
+                </a:tc>
+                <a:tc>
+                  <a:txBody>
+                    <a:bodyPr/>
+                    <a:lstStyle/>
+                    <a:p>
+                      <a:r>
+                        <a:rPr lang="de-DE" sz="1400" noProof="0" dirty="0"/>
+                        <a:t>Erledigt</a:t>
+                      </a:r>
+                    </a:p>
+                  </a:txBody>
+                  <a:tcPr/>
+                </a:tc>
+                <a:extLst>
+                  <a:ext uri="{0D108BD9-81ED-4DB2-BD59-A6C34878D82A}">
+                    <a16:rowId xmlns:a16="http://schemas.microsoft.com/office/drawing/2014/main" val="432160553"/>
+                  </a:ext>
+                </a:extLst>
+              </a:tr>
+              <a:tr h="728456">
+                <a:tc>
+                  <a:txBody>
+                    <a:bodyPr/>
+                    <a:lstStyle/>
+                    <a:p>
+                      <a:pPr marL="0" marR="0" lvl="0" indent="0" algn="l" defTabSz="914400" rtl="0" eaLnBrk="1" fontAlgn="auto" latinLnBrk="0" hangingPunct="1">
+                        <a:lnSpc>
+                          <a:spcPct val="100000"/>
+                        </a:lnSpc>
+                        <a:spcBef>
+                          <a:spcPts val="0"/>
+                        </a:spcBef>
+                        <a:spcAft>
+                          <a:spcPts val="0"/>
+                        </a:spcAft>
+                        <a:buClrTx/>
+                        <a:buSzTx/>
+                        <a:buFontTx/>
+                        <a:buNone/>
+                        <a:tabLst/>
+                        <a:defRPr/>
+                      </a:pPr>
+                      <a:r>
+                        <a:rPr lang="de-DE" sz="1400" noProof="0" dirty="0"/>
+                        <a:t>Implementierung der Küchenansicht</a:t>
+                      </a:r>
+                    </a:p>
+                  </a:txBody>
+                  <a:tcPr/>
+                </a:tc>
+                <a:tc>
+                  <a:txBody>
+                    <a:bodyPr/>
+                    <a:lstStyle/>
+                    <a:p>
+                      <a:r>
+                        <a:rPr lang="de-DE" sz="1400" noProof="0" dirty="0"/>
+                        <a:t>Hans Bloching</a:t>
+                      </a:r>
+                    </a:p>
+                    <a:p>
+                      <a:r>
+                        <a:rPr lang="de-DE" sz="1400" noProof="0" dirty="0"/>
+                        <a:t>Vincent Knapp</a:t>
+                      </a:r>
+                    </a:p>
+                    <a:p>
+                      <a:r>
+                        <a:rPr lang="de-DE" sz="1400" noProof="0" dirty="0"/>
+                        <a:t>René Weber</a:t>
+                      </a:r>
+                    </a:p>
+                  </a:txBody>
+                  <a:tcPr/>
+                </a:tc>
+                <a:tc>
+                  <a:txBody>
+                    <a:bodyPr/>
+                    <a:lstStyle/>
+                    <a:p>
+                      <a:r>
+                        <a:rPr lang="de-DE" sz="1400" noProof="0" dirty="0"/>
+                        <a:t>5</a:t>
+                      </a:r>
+                    </a:p>
+                  </a:txBody>
+                  <a:tcPr/>
+                </a:tc>
+                <a:tc>
+                  <a:txBody>
+                    <a:bodyPr/>
+                    <a:lstStyle/>
+                    <a:p>
+                      <a:r>
+                        <a:rPr lang="de-DE" sz="1400" noProof="0" dirty="0"/>
+                        <a:t>7</a:t>
+                      </a:r>
+                    </a:p>
+                  </a:txBody>
+                  <a:tcPr/>
+                </a:tc>
+                <a:tc>
+                  <a:txBody>
+                    <a:bodyPr/>
+                    <a:lstStyle/>
+                    <a:p>
+                      <a:r>
+                        <a:rPr lang="de-DE" sz="1400" noProof="0" dirty="0"/>
+                        <a:t>Erledigt</a:t>
+                      </a:r>
+                    </a:p>
+                  </a:txBody>
+                  <a:tcPr/>
+                </a:tc>
+                <a:extLst>
+                  <a:ext uri="{0D108BD9-81ED-4DB2-BD59-A6C34878D82A}">
+                    <a16:rowId xmlns:a16="http://schemas.microsoft.com/office/drawing/2014/main" val="740267785"/>
+                  </a:ext>
+                </a:extLst>
+              </a:tr>
+              <a:tr h="515990">
+                <a:tc>
+                  <a:txBody>
+                    <a:bodyPr/>
+                    <a:lstStyle/>
+                    <a:p>
+                      <a:r>
+                        <a:rPr lang="de-DE" sz="1400" noProof="0" dirty="0"/>
+                        <a:t>Logik: Anpassen von Speisen im Warenkorb</a:t>
+                      </a:r>
+                    </a:p>
+                  </a:txBody>
+                  <a:tcPr/>
+                </a:tc>
+                <a:tc>
+                  <a:txBody>
+                    <a:bodyPr/>
+                    <a:lstStyle/>
+                    <a:p>
+                      <a:r>
+                        <a:rPr lang="de-DE" sz="1400" noProof="0" dirty="0"/>
+                        <a:t>Vincent Knapp</a:t>
+                      </a:r>
+                    </a:p>
+                    <a:p>
+                      <a:r>
+                        <a:rPr lang="de-DE" sz="1400" noProof="0" dirty="0"/>
+                        <a:t>René Weber</a:t>
+                      </a:r>
+                    </a:p>
+                  </a:txBody>
+                  <a:tcPr/>
+                </a:tc>
+                <a:tc>
+                  <a:txBody>
+                    <a:bodyPr/>
+                    <a:lstStyle/>
+                    <a:p>
+                      <a:r>
+                        <a:rPr lang="de-DE" sz="1400" noProof="0" dirty="0"/>
+                        <a:t>4</a:t>
+                      </a:r>
+                    </a:p>
+                  </a:txBody>
+                  <a:tcPr/>
+                </a:tc>
+                <a:tc>
+                  <a:txBody>
+                    <a:bodyPr/>
+                    <a:lstStyle/>
+                    <a:p>
+                      <a:r>
+                        <a:rPr lang="de-DE" sz="1400" noProof="0" dirty="0"/>
+                        <a:t>4</a:t>
+                      </a:r>
+                    </a:p>
+                  </a:txBody>
+                  <a:tcPr/>
+                </a:tc>
+                <a:tc>
+                  <a:txBody>
+                    <a:bodyPr/>
+                    <a:lstStyle/>
+                    <a:p>
+                      <a:r>
+                        <a:rPr lang="de-DE" sz="1400" noProof="0" dirty="0"/>
+                        <a:t>Erledigt</a:t>
+                      </a:r>
+                    </a:p>
+                  </a:txBody>
+                  <a:tcPr/>
+                </a:tc>
+                <a:extLst>
+                  <a:ext uri="{0D108BD9-81ED-4DB2-BD59-A6C34878D82A}">
+                    <a16:rowId xmlns:a16="http://schemas.microsoft.com/office/drawing/2014/main" val="2603736860"/>
+                  </a:ext>
+                </a:extLst>
+              </a:tr>
+              <a:tr h="515990">
+                <a:tc>
+                  <a:txBody>
+                    <a:bodyPr/>
+                    <a:lstStyle/>
+                    <a:p>
+                      <a:r>
+                        <a:rPr lang="de-DE" sz="1400" noProof="0" dirty="0"/>
+                        <a:t>Logik: Automatische Kalkulation der Kosten</a:t>
+                      </a:r>
+                    </a:p>
+                  </a:txBody>
+                  <a:tcPr/>
+                </a:tc>
+                <a:tc>
+                  <a:txBody>
+                    <a:bodyPr/>
+                    <a:lstStyle/>
+                    <a:p>
+                      <a:r>
+                        <a:rPr lang="de-DE" sz="1400" noProof="0" dirty="0"/>
+                        <a:t>Vincent Knapp</a:t>
+                      </a:r>
+                    </a:p>
+                  </a:txBody>
+                  <a:tcPr/>
+                </a:tc>
+                <a:tc>
+                  <a:txBody>
+                    <a:bodyPr/>
+                    <a:lstStyle/>
+                    <a:p>
+                      <a:r>
+                        <a:rPr lang="de-DE" sz="1400" noProof="0" dirty="0"/>
+                        <a:t>6</a:t>
+                      </a:r>
+                    </a:p>
+                  </a:txBody>
+                  <a:tcPr/>
+                </a:tc>
+                <a:tc>
+                  <a:txBody>
+                    <a:bodyPr/>
+                    <a:lstStyle/>
+                    <a:p>
+                      <a:r>
+                        <a:rPr lang="de-DE" sz="1400" noProof="0" dirty="0"/>
+                        <a:t>6</a:t>
+                      </a:r>
+                    </a:p>
+                  </a:txBody>
+                  <a:tcPr/>
+                </a:tc>
+                <a:tc>
+                  <a:txBody>
+                    <a:bodyPr/>
+                    <a:lstStyle/>
+                    <a:p>
+                      <a:r>
+                        <a:rPr lang="de-DE" sz="1400" noProof="0" dirty="0"/>
+                        <a:t>Erledigt</a:t>
+                      </a:r>
+                    </a:p>
+                  </a:txBody>
+                  <a:tcPr/>
+                </a:tc>
+                <a:extLst>
+                  <a:ext uri="{0D108BD9-81ED-4DB2-BD59-A6C34878D82A}">
+                    <a16:rowId xmlns:a16="http://schemas.microsoft.com/office/drawing/2014/main" val="4252090113"/>
+                  </a:ext>
+                </a:extLst>
+              </a:tr>
+              <a:tr h="515990">
+                <a:tc>
+                  <a:txBody>
+                    <a:bodyPr/>
+                    <a:lstStyle/>
+                    <a:p>
+                      <a:r>
+                        <a:rPr lang="de-DE" sz="1400" noProof="0" dirty="0"/>
+                        <a:t>Logik: Absenden der Bestellung für spezifische Tischnummer</a:t>
+                      </a:r>
+                    </a:p>
+                  </a:txBody>
+                  <a:tcPr/>
+                </a:tc>
+                <a:tc>
+                  <a:txBody>
+                    <a:bodyPr/>
+                    <a:lstStyle/>
+                    <a:p>
+                      <a:r>
+                        <a:rPr lang="de-DE" sz="1400" noProof="0" dirty="0"/>
+                        <a:t>Vincent Knapp</a:t>
+                      </a:r>
+                    </a:p>
+                    <a:p>
+                      <a:r>
+                        <a:rPr lang="de-DE" sz="1400" noProof="0" dirty="0"/>
+                        <a:t>Dennis Haaf</a:t>
+                      </a:r>
+                    </a:p>
+                  </a:txBody>
+                  <a:tcPr/>
+                </a:tc>
+                <a:tc>
+                  <a:txBody>
+                    <a:bodyPr/>
+                    <a:lstStyle/>
+                    <a:p>
+                      <a:r>
+                        <a:rPr lang="de-DE" sz="1400" noProof="0" dirty="0"/>
+                        <a:t>5</a:t>
+                      </a:r>
+                    </a:p>
+                  </a:txBody>
+                  <a:tcPr/>
+                </a:tc>
+                <a:tc>
+                  <a:txBody>
+                    <a:bodyPr/>
+                    <a:lstStyle/>
+                    <a:p>
+                      <a:r>
+                        <a:rPr lang="de-DE" sz="1400" noProof="0" dirty="0"/>
+                        <a:t>5</a:t>
+                      </a:r>
+                    </a:p>
+                  </a:txBody>
+                  <a:tcPr/>
+                </a:tc>
+                <a:tc>
+                  <a:txBody>
+                    <a:bodyPr/>
+                    <a:lstStyle/>
+                    <a:p>
+                      <a:r>
+                        <a:rPr lang="de-DE" sz="1400" noProof="0" dirty="0"/>
+                        <a:t>Erledigt</a:t>
+                      </a:r>
+                    </a:p>
+                  </a:txBody>
+                  <a:tcPr/>
+                </a:tc>
+                <a:extLst>
+                  <a:ext uri="{0D108BD9-81ED-4DB2-BD59-A6C34878D82A}">
+                    <a16:rowId xmlns:a16="http://schemas.microsoft.com/office/drawing/2014/main" val="1091053033"/>
+                  </a:ext>
+                </a:extLst>
+              </a:tr>
+              <a:tr h="728456">
+                <a:tc>
+                  <a:txBody>
+                    <a:bodyPr/>
+                    <a:lstStyle/>
+                    <a:p>
+                      <a:r>
+                        <a:rPr lang="de-DE" sz="1400" noProof="0" dirty="0"/>
+                        <a:t>Abschluss Warenkorb</a:t>
+                      </a:r>
+                    </a:p>
+                  </a:txBody>
+                  <a:tcPr/>
+                </a:tc>
+                <a:tc>
+                  <a:txBody>
+                    <a:bodyPr/>
+                    <a:lstStyle/>
+                    <a:p>
+                      <a:r>
+                        <a:rPr lang="de-DE" sz="1400" noProof="0" dirty="0"/>
+                        <a:t>Hans Bloching</a:t>
+                      </a:r>
+                    </a:p>
+                    <a:p>
+                      <a:r>
+                        <a:rPr lang="de-DE" sz="1400" noProof="0" dirty="0"/>
+                        <a:t>Vincent Knapp</a:t>
+                      </a:r>
+                    </a:p>
+                    <a:p>
+                      <a:r>
+                        <a:rPr lang="de-DE" sz="1400" noProof="0" dirty="0"/>
+                        <a:t>René Weber</a:t>
+                      </a:r>
+                    </a:p>
+                  </a:txBody>
+                  <a:tcPr/>
+                </a:tc>
+                <a:tc>
+                  <a:txBody>
+                    <a:bodyPr/>
+                    <a:lstStyle/>
+                    <a:p>
+                      <a:r>
+                        <a:rPr lang="de-DE" sz="1400" noProof="0" dirty="0"/>
+                        <a:t>6</a:t>
+                      </a:r>
+                    </a:p>
+                  </a:txBody>
+                  <a:tcPr/>
+                </a:tc>
+                <a:tc>
+                  <a:txBody>
+                    <a:bodyPr/>
+                    <a:lstStyle/>
+                    <a:p>
+                      <a:r>
+                        <a:rPr lang="de-DE" sz="1400" noProof="0" dirty="0"/>
+                        <a:t>6</a:t>
+                      </a:r>
+                    </a:p>
+                  </a:txBody>
+                  <a:tcPr/>
+                </a:tc>
+                <a:tc>
+                  <a:txBody>
+                    <a:bodyPr/>
+                    <a:lstStyle/>
+                    <a:p>
+                      <a:r>
+                        <a:rPr lang="de-DE" sz="1400" noProof="0" dirty="0"/>
+                        <a:t>Erledigt</a:t>
+                      </a:r>
+                    </a:p>
+                  </a:txBody>
+                  <a:tcPr/>
+                </a:tc>
+                <a:extLst>
+                  <a:ext uri="{0D108BD9-81ED-4DB2-BD59-A6C34878D82A}">
+                    <a16:rowId xmlns:a16="http://schemas.microsoft.com/office/drawing/2014/main" val="2446957633"/>
+                  </a:ext>
+                </a:extLst>
+              </a:tr>
+            </a:tbl>
+          </a:graphicData>
+        </a:graphic>
+      </p:graphicFrame>
+    </p:spTree>
+    <p:extLst>
+      <p:ext uri="{BB962C8B-B14F-4D97-AF65-F5344CB8AC3E}">
+        <p14:creationId xmlns:p14="http://schemas.microsoft.com/office/powerpoint/2010/main" val="704317053"/>
+      </p:ext>
+    </p:extLst>
+  </p:cSld>
+  <p:clrMapOvr>
+    <a:masterClrMapping/>
+  </p:clrMapOvr>
+</p:sld>
+</file>
+
+<file path=ppt/slides/slide13.xml><?xml version="1.0" encoding="utf-8"?>
+<p:sld xmlns:a="http://schemas.openxmlformats.org/drawingml/2006/main" xmlns:r="http://schemas.openxmlformats.org/officeDocument/2006/relationships" xmlns:p="http://schemas.openxmlformats.org/presentationml/2006/main">
+  <p:cSld>
+    <p:spTree>
+      <p:nvGrpSpPr>
+        <p:cNvPr id="1" name="">
+          <a:extLst>
+            <a:ext uri="{FF2B5EF4-FFF2-40B4-BE49-F238E27FC236}">
               <a16:creationId xmlns:a16="http://schemas.microsoft.com/office/drawing/2014/main" id="{40351EEA-BA7C-3B90-561D-0D11492BE107}"/>
             </a:ext>
           </a:extLst>
@@ -6297,7 +7193,7 @@
           <a:p>
             <a:fld id="{42B45B56-1D88-4042-8DF0-EB6B41B710D3}" type="datetime1">
               <a:rPr lang="de-DE" noProof="0" smtClean="0"/>
-              <a:t>11.12.2024</a:t>
+              <a:t>12.12.2024</a:t>
             </a:fld>
             <a:endParaRPr lang="de-DE" noProof="0" dirty="0"/>
           </a:p>
@@ -6326,7 +7222,7 @@
           <a:p>
             <a:fld id="{07CE569E-9B7C-4CB9-AB80-C0841F922CFF}" type="slidenum">
               <a:rPr lang="de-DE" noProof="0" smtClean="0"/>
-              <a:t>12</a:t>
+              <a:t>13</a:t>
             </a:fld>
             <a:endParaRPr lang="de-DE" noProof="0" dirty="0"/>
           </a:p>
@@ -6774,185 +7670,116 @@
           </a:p>
         </p:txBody>
       </p:sp>
+      <p:sp>
+        <p:nvSpPr>
+          <p:cNvPr id="7" name="Textfeld 6">
+            <a:extLst>
+              <a:ext uri="{FF2B5EF4-FFF2-40B4-BE49-F238E27FC236}">
+                <a16:creationId xmlns:a16="http://schemas.microsoft.com/office/drawing/2014/main" id="{879F137C-877B-196F-AB88-30822F84DAD2}"/>
+              </a:ext>
+            </a:extLst>
+          </p:cNvPr>
+          <p:cNvSpPr txBox="1"/>
+          <p:nvPr/>
+        </p:nvSpPr>
+        <p:spPr>
+          <a:xfrm>
+            <a:off x="9260601" y="1417627"/>
+            <a:ext cx="2669557" cy="3970318"/>
+          </a:xfrm>
+          <a:prstGeom prst="rect">
+            <a:avLst/>
+          </a:prstGeom>
+          <a:noFill/>
+        </p:spPr>
+        <p:txBody>
+          <a:bodyPr wrap="square" rtlCol="0">
+            <a:spAutoFit/>
+          </a:bodyPr>
+          <a:lstStyle/>
+          <a:p>
+            <a:r>
+              <a:rPr lang="de-DE" dirty="0"/>
+              <a:t>Layout</a:t>
+            </a:r>
+          </a:p>
+          <a:p>
+            <a:r>
+              <a:rPr lang="de-DE" dirty="0"/>
+              <a:t>Design</a:t>
+            </a:r>
+          </a:p>
+          <a:p>
+            <a:r>
+              <a:rPr lang="de-DE" dirty="0"/>
+              <a:t>Anbindung API</a:t>
+            </a:r>
+          </a:p>
+          <a:p>
+            <a:r>
+              <a:rPr lang="de-DE" dirty="0"/>
+              <a:t>Anpassen Felder für API Erweiterung</a:t>
+            </a:r>
+          </a:p>
+          <a:p>
+            <a:endParaRPr lang="de-DE" dirty="0"/>
+          </a:p>
+          <a:p>
+            <a:r>
+              <a:rPr lang="de-DE" dirty="0"/>
+              <a:t>Küchenansicht optimieren</a:t>
+            </a:r>
+          </a:p>
+          <a:p>
+            <a:r>
+              <a:rPr lang="de-DE" dirty="0"/>
+              <a:t>--&gt; </a:t>
+            </a:r>
+            <a:r>
+              <a:rPr lang="de-DE" dirty="0" err="1"/>
+              <a:t>Grouping</a:t>
+            </a:r>
+            <a:r>
+              <a:rPr lang="de-DE" dirty="0"/>
+              <a:t> per Table</a:t>
+            </a:r>
+          </a:p>
+          <a:p>
+            <a:r>
+              <a:rPr lang="de-DE" dirty="0"/>
+              <a:t>--&gt; </a:t>
+            </a:r>
+            <a:r>
+              <a:rPr lang="de-DE" dirty="0" err="1"/>
+              <a:t>Grouping</a:t>
+            </a:r>
+            <a:r>
+              <a:rPr lang="de-DE" dirty="0"/>
+              <a:t> per Artikel</a:t>
+            </a:r>
+          </a:p>
+          <a:p>
+            <a:pPr marL="285750" indent="-285750">
+              <a:buFont typeface="Wingdings" panose="05000000000000000000" pitchFamily="2" charset="2"/>
+              <a:buChar char="à"/>
+            </a:pPr>
+            <a:r>
+              <a:rPr lang="de-DE" dirty="0"/>
+              <a:t>Switchen zwischen diesen Ansichten</a:t>
+            </a:r>
+          </a:p>
+          <a:p>
+            <a:r>
+              <a:rPr lang="de-DE" dirty="0"/>
+              <a:t>Hosting</a:t>
+            </a:r>
+          </a:p>
+        </p:txBody>
+      </p:sp>
     </p:spTree>
     <p:extLst>
       <p:ext uri="{BB962C8B-B14F-4D97-AF65-F5344CB8AC3E}">
         <p14:creationId xmlns:p14="http://schemas.microsoft.com/office/powerpoint/2010/main" val="1110673821"/>
-      </p:ext>
-    </p:extLst>
-  </p:cSld>
-  <p:clrMapOvr>
-    <a:masterClrMapping/>
-  </p:clrMapOvr>
-</p:sld>
-</file>
-
-<file path=ppt/slides/slide13.xml><?xml version="1.0" encoding="utf-8"?>
-<p:sld xmlns:a="http://schemas.openxmlformats.org/drawingml/2006/main" xmlns:r="http://schemas.openxmlformats.org/officeDocument/2006/relationships" xmlns:p="http://schemas.openxmlformats.org/presentationml/2006/main">
-  <p:cSld>
-    <p:spTree>
-      <p:nvGrpSpPr>
-        <p:cNvPr id="1" name=""/>
-        <p:cNvGrpSpPr/>
-        <p:nvPr/>
-      </p:nvGrpSpPr>
-      <p:grpSpPr>
-        <a:xfrm>
-          <a:off x="0" y="0"/>
-          <a:ext cx="0" cy="0"/>
-          <a:chOff x="0" y="0"/>
-          <a:chExt cx="0" cy="0"/>
-        </a:xfrm>
-      </p:grpSpPr>
-      <p:sp>
-        <p:nvSpPr>
-          <p:cNvPr id="2" name="Titel 1">
-            <a:extLst>
-              <a:ext uri="{FF2B5EF4-FFF2-40B4-BE49-F238E27FC236}">
-                <a16:creationId xmlns:a16="http://schemas.microsoft.com/office/drawing/2014/main" id="{86AADDDC-CD07-D152-F98D-6AA7ABFFAE93}"/>
-              </a:ext>
-            </a:extLst>
-          </p:cNvPr>
-          <p:cNvSpPr>
-            <a:spLocks noGrp="1"/>
-          </p:cNvSpPr>
-          <p:nvPr>
-            <p:ph type="title"/>
-          </p:nvPr>
-        </p:nvSpPr>
-        <p:spPr/>
-        <p:txBody>
-          <a:bodyPr/>
-          <a:lstStyle/>
-          <a:p>
-            <a:r>
-              <a:rPr lang="de-DE" noProof="0" dirty="0"/>
-              <a:t>5. Ausblick auf den folgenden Sprint ??</a:t>
-            </a:r>
-          </a:p>
-        </p:txBody>
-      </p:sp>
-      <p:sp>
-        <p:nvSpPr>
-          <p:cNvPr id="3" name="Inhaltsplatzhalter 2">
-            <a:extLst>
-              <a:ext uri="{FF2B5EF4-FFF2-40B4-BE49-F238E27FC236}">
-                <a16:creationId xmlns:a16="http://schemas.microsoft.com/office/drawing/2014/main" id="{5E854AF4-9867-751A-7A8B-348123EF4C14}"/>
-              </a:ext>
-            </a:extLst>
-          </p:cNvPr>
-          <p:cNvSpPr>
-            <a:spLocks noGrp="1"/>
-          </p:cNvSpPr>
-          <p:nvPr>
-            <p:ph idx="1"/>
-          </p:nvPr>
-        </p:nvSpPr>
-        <p:spPr/>
-        <p:txBody>
-          <a:bodyPr/>
-          <a:lstStyle/>
-          <a:p>
-            <a:r>
-              <a:rPr lang="de-DE" sz="2800" noProof="0" dirty="0"/>
-              <a:t>Warenkorb Erstellung abschließen</a:t>
-            </a:r>
-          </a:p>
-          <a:p>
-            <a:r>
-              <a:rPr lang="de-DE" noProof="0" dirty="0"/>
-              <a:t>Logik “Anpassen von Speisen im Warenkorb”</a:t>
-            </a:r>
-          </a:p>
-          <a:p>
-            <a:r>
-              <a:rPr lang="de-DE" sz="2800" noProof="0" dirty="0"/>
-              <a:t>Logik </a:t>
-            </a:r>
-            <a:r>
-              <a:rPr lang="de-DE" noProof="0" dirty="0"/>
-              <a:t>“</a:t>
-            </a:r>
-            <a:r>
-              <a:rPr lang="de-DE" noProof="0" dirty="0" err="1"/>
-              <a:t>Autom</a:t>
-            </a:r>
-            <a:r>
-              <a:rPr lang="de-DE" noProof="0" dirty="0"/>
-              <a:t>. Kalkulation der Kosten”</a:t>
-            </a:r>
-            <a:endParaRPr lang="de-DE" sz="2800" noProof="0" dirty="0"/>
-          </a:p>
-          <a:p>
-            <a:r>
-              <a:rPr lang="de-DE" noProof="0" dirty="0"/>
-              <a:t>Logik zum Absenden der Bestellung</a:t>
-            </a:r>
-          </a:p>
-        </p:txBody>
-      </p:sp>
-      <p:sp>
-        <p:nvSpPr>
-          <p:cNvPr id="4" name="Datumsplatzhalter 3">
-            <a:extLst>
-              <a:ext uri="{FF2B5EF4-FFF2-40B4-BE49-F238E27FC236}">
-                <a16:creationId xmlns:a16="http://schemas.microsoft.com/office/drawing/2014/main" id="{305A6BE5-5A63-7D28-E770-729A20618D33}"/>
-              </a:ext>
-            </a:extLst>
-          </p:cNvPr>
-          <p:cNvSpPr>
-            <a:spLocks noGrp="1"/>
-          </p:cNvSpPr>
-          <p:nvPr>
-            <p:ph type="dt" sz="half" idx="10"/>
-          </p:nvPr>
-        </p:nvSpPr>
-        <p:spPr/>
-        <p:txBody>
-          <a:bodyPr/>
-          <a:lstStyle/>
-          <a:p>
-            <a:fld id="{42B45B56-1D88-4042-8DF0-EB6B41B710D3}" type="datetime1">
-              <a:rPr lang="de-DE" noProof="0" smtClean="0"/>
-              <a:t>11.12.2024</a:t>
-            </a:fld>
-            <a:endParaRPr lang="de-DE" noProof="0" dirty="0"/>
-          </a:p>
-        </p:txBody>
-      </p:sp>
-      <p:sp>
-        <p:nvSpPr>
-          <p:cNvPr id="5" name="Foliennummernplatzhalter 4">
-            <a:extLst>
-              <a:ext uri="{FF2B5EF4-FFF2-40B4-BE49-F238E27FC236}">
-                <a16:creationId xmlns:a16="http://schemas.microsoft.com/office/drawing/2014/main" id="{E28ABC24-8900-E378-E502-62B817D571F6}"/>
-              </a:ext>
-            </a:extLst>
-          </p:cNvPr>
-          <p:cNvSpPr>
-            <a:spLocks noGrp="1"/>
-          </p:cNvSpPr>
-          <p:nvPr>
-            <p:ph type="sldNum" sz="quarter" idx="12"/>
-          </p:nvPr>
-        </p:nvSpPr>
-        <p:spPr/>
-        <p:txBody>
-          <a:bodyPr/>
-          <a:lstStyle/>
-          <a:p>
-            <a:fld id="{07CE569E-9B7C-4CB9-AB80-C0841F922CFF}" type="slidenum">
-              <a:rPr lang="de-DE" noProof="0" smtClean="0"/>
-              <a:t>13</a:t>
-            </a:fld>
-            <a:endParaRPr lang="de-DE" noProof="0" dirty="0"/>
-          </a:p>
-        </p:txBody>
-      </p:sp>
-    </p:spTree>
-    <p:extLst>
-      <p:ext uri="{BB962C8B-B14F-4D97-AF65-F5344CB8AC3E}">
-        <p14:creationId xmlns:p14="http://schemas.microsoft.com/office/powerpoint/2010/main" val="3562051256"/>
       </p:ext>
     </p:extLst>
   </p:cSld>
@@ -6984,7 +7811,7 @@
           <p:cNvPr id="2" name="Titel 1">
             <a:extLst>
               <a:ext uri="{FF2B5EF4-FFF2-40B4-BE49-F238E27FC236}">
-                <a16:creationId xmlns:a16="http://schemas.microsoft.com/office/drawing/2014/main" id="{A075FF74-E5D2-1C9F-1DF3-DCD54EF547E9}"/>
+                <a16:creationId xmlns:a16="http://schemas.microsoft.com/office/drawing/2014/main" id="{86AADDDC-CD07-D152-F98D-6AA7ABFFAE93}"/>
               </a:ext>
             </a:extLst>
           </p:cNvPr>
@@ -7002,7 +7829,7 @@
           <a:p>
             <a:r>
               <a:rPr lang="de-DE" noProof="0" dirty="0"/>
-              <a:t>6. Software-Tools</a:t>
+              <a:t>5. Ausblick auf den folgenden Sprint</a:t>
             </a:r>
           </a:p>
         </p:txBody>
@@ -7012,127 +7839,45 @@
           <p:cNvPr id="3" name="Inhaltsplatzhalter 2">
             <a:extLst>
               <a:ext uri="{FF2B5EF4-FFF2-40B4-BE49-F238E27FC236}">
-                <a16:creationId xmlns:a16="http://schemas.microsoft.com/office/drawing/2014/main" id="{E627C203-A1B7-383D-97A8-56B3248A1E83}"/>
-              </a:ext>
-            </a:extLst>
-          </p:cNvPr>
-          <p:cNvSpPr>
-            <a:spLocks noGrp="1"/>
-          </p:cNvSpPr>
-          <p:nvPr>
-            <p:ph sz="half" idx="1"/>
+                <a16:creationId xmlns:a16="http://schemas.microsoft.com/office/drawing/2014/main" id="{5E854AF4-9867-751A-7A8B-348123EF4C14}"/>
+              </a:ext>
+            </a:extLst>
+          </p:cNvPr>
+          <p:cNvSpPr>
+            <a:spLocks noGrp="1"/>
+          </p:cNvSpPr>
+          <p:nvPr>
+            <p:ph idx="1"/>
           </p:nvPr>
         </p:nvSpPr>
         <p:spPr/>
         <p:txBody>
-          <a:bodyPr>
-            <a:normAutofit/>
-          </a:bodyPr>
-          <a:lstStyle/>
-          <a:p>
-            <a:r>
-              <a:rPr lang="de-DE" noProof="0" dirty="0"/>
-              <a:t>Programmiersprache:</a:t>
-            </a:r>
-          </a:p>
-          <a:p>
-            <a:pPr lvl="1"/>
-            <a:r>
-              <a:rPr lang="de-DE" noProof="0" dirty="0"/>
-              <a:t>C#</a:t>
-            </a:r>
-          </a:p>
-          <a:p>
-            <a:r>
-              <a:rPr lang="de-DE" noProof="0" dirty="0"/>
-              <a:t>Framework:</a:t>
-            </a:r>
-          </a:p>
-          <a:p>
-            <a:pPr lvl="1"/>
-            <a:r>
-              <a:rPr lang="de-DE" noProof="0" dirty="0" err="1"/>
-              <a:t>Blazor</a:t>
-            </a:r>
-            <a:endParaRPr lang="de-DE" noProof="0" dirty="0"/>
-          </a:p>
-          <a:p>
-            <a:r>
-              <a:rPr lang="de-DE" noProof="0" dirty="0"/>
-              <a:t>IDE:</a:t>
-            </a:r>
-          </a:p>
-          <a:p>
-            <a:pPr lvl="1"/>
-            <a:r>
-              <a:rPr lang="de-DE" noProof="0" dirty="0"/>
-              <a:t>Visual Studio</a:t>
-            </a:r>
-          </a:p>
-        </p:txBody>
-      </p:sp>
-      <p:sp>
-        <p:nvSpPr>
-          <p:cNvPr id="6" name="Inhaltsplatzhalter 5">
-            <a:extLst>
-              <a:ext uri="{FF2B5EF4-FFF2-40B4-BE49-F238E27FC236}">
-                <a16:creationId xmlns:a16="http://schemas.microsoft.com/office/drawing/2014/main" id="{7185288F-FFC3-A9CF-5040-625A8A619580}"/>
-              </a:ext>
-            </a:extLst>
-          </p:cNvPr>
-          <p:cNvSpPr>
-            <a:spLocks noGrp="1"/>
-          </p:cNvSpPr>
-          <p:nvPr>
-            <p:ph sz="half" idx="2"/>
-          </p:nvPr>
-        </p:nvSpPr>
-        <p:spPr/>
-        <p:txBody>
-          <a:bodyPr>
-            <a:normAutofit/>
-          </a:bodyPr>
-          <a:lstStyle/>
-          <a:p>
-            <a:r>
-              <a:rPr lang="de-DE" noProof="0" dirty="0"/>
-              <a:t>Datenbank:</a:t>
-            </a:r>
-          </a:p>
-          <a:p>
-            <a:pPr lvl="1"/>
-            <a:r>
-              <a:rPr lang="de-DE" noProof="0" dirty="0"/>
-              <a:t>SQLite</a:t>
-            </a:r>
-          </a:p>
-          <a:p>
-            <a:r>
-              <a:rPr lang="de-DE" noProof="0" dirty="0"/>
-              <a:t>Weitere Tools:</a:t>
-            </a:r>
-          </a:p>
-          <a:p>
-            <a:pPr lvl="1"/>
-            <a:r>
-              <a:rPr lang="de-DE" noProof="0" dirty="0"/>
-              <a:t>Git (Versionierung)</a:t>
-            </a:r>
-          </a:p>
-          <a:p>
-            <a:pPr lvl="1"/>
-            <a:r>
-              <a:rPr lang="de-DE" noProof="0" dirty="0"/>
-              <a:t>Docker (</a:t>
-            </a:r>
-            <a:r>
-              <a:rPr lang="de-DE" noProof="0" dirty="0" err="1"/>
-              <a:t>Deployment</a:t>
-            </a:r>
-            <a:r>
-              <a:rPr lang="de-DE" noProof="0" dirty="0"/>
-              <a:t>)</a:t>
-            </a:r>
+          <a:bodyPr/>
+          <a:lstStyle/>
+          <a:p>
+            <a:r>
+              <a:rPr lang="de-DE" sz="2800" dirty="0"/>
+              <a:t>Layout/Design überarbeiten.</a:t>
+            </a:r>
+          </a:p>
+          <a:p>
+            <a:r>
+              <a:rPr lang="de-DE" sz="2800" dirty="0"/>
+              <a:t>Anbindung API.</a:t>
+            </a:r>
+          </a:p>
+          <a:p>
+            <a:r>
+              <a:rPr lang="de-DE" sz="2800" dirty="0"/>
+              <a:t>(evtl. Küchenansicht optimieren).</a:t>
+            </a:r>
+          </a:p>
+          <a:p>
+            <a:r>
+              <a:rPr lang="de-DE" dirty="0"/>
+              <a:t>Hosting</a:t>
+            </a:r>
+            <a:endParaRPr lang="de-DE" sz="2800" dirty="0"/>
           </a:p>
         </p:txBody>
       </p:sp>
@@ -7141,7 +7886,7 @@
           <p:cNvPr id="4" name="Datumsplatzhalter 3">
             <a:extLst>
               <a:ext uri="{FF2B5EF4-FFF2-40B4-BE49-F238E27FC236}">
-                <a16:creationId xmlns:a16="http://schemas.microsoft.com/office/drawing/2014/main" id="{F5985418-FDA1-F1A7-80E8-C25C6BAC324B}"/>
+                <a16:creationId xmlns:a16="http://schemas.microsoft.com/office/drawing/2014/main" id="{305A6BE5-5A63-7D28-E770-729A20618D33}"/>
               </a:ext>
             </a:extLst>
           </p:cNvPr>
@@ -7159,7 +7904,7 @@
           <a:p>
             <a:fld id="{42B45B56-1D88-4042-8DF0-EB6B41B710D3}" type="datetime1">
               <a:rPr lang="de-DE" noProof="0" smtClean="0"/>
-              <a:t>11.12.2024</a:t>
+              <a:t>12.12.2024</a:t>
             </a:fld>
             <a:endParaRPr lang="de-DE" noProof="0" dirty="0"/>
           </a:p>
@@ -7170,7 +7915,7 @@
           <p:cNvPr id="5" name="Foliennummernplatzhalter 4">
             <a:extLst>
               <a:ext uri="{FF2B5EF4-FFF2-40B4-BE49-F238E27FC236}">
-                <a16:creationId xmlns:a16="http://schemas.microsoft.com/office/drawing/2014/main" id="{6A7A11C6-83C4-FA07-F8C7-F2826F8F22B6}"/>
+                <a16:creationId xmlns:a16="http://schemas.microsoft.com/office/drawing/2014/main" id="{E28ABC24-8900-E378-E502-62B817D571F6}"/>
               </a:ext>
             </a:extLst>
           </p:cNvPr>
@@ -7197,7 +7942,7 @@
     </p:spTree>
     <p:extLst>
       <p:ext uri="{BB962C8B-B14F-4D97-AF65-F5344CB8AC3E}">
-        <p14:creationId xmlns:p14="http://schemas.microsoft.com/office/powerpoint/2010/main" val="1367875186"/>
+        <p14:creationId xmlns:p14="http://schemas.microsoft.com/office/powerpoint/2010/main" val="3562051256"/>
       </p:ext>
     </p:extLst>
   </p:cSld>
@@ -7229,7 +7974,7 @@
           <p:cNvPr id="2" name="Titel 1">
             <a:extLst>
               <a:ext uri="{FF2B5EF4-FFF2-40B4-BE49-F238E27FC236}">
-                <a16:creationId xmlns:a16="http://schemas.microsoft.com/office/drawing/2014/main" id="{32CCE440-A4CB-26A7-5B3F-3F9D4B878A95}"/>
+                <a16:creationId xmlns:a16="http://schemas.microsoft.com/office/drawing/2014/main" id="{A075FF74-E5D2-1C9F-1DF3-DCD54EF547E9}"/>
               </a:ext>
             </a:extLst>
           </p:cNvPr>
@@ -7247,7 +7992,71 @@
           <a:p>
             <a:r>
               <a:rPr lang="de-DE" noProof="0" dirty="0"/>
-              <a:t>7. SOUPs/OTS</a:t>
+              <a:t>6. Software-Tools</a:t>
+            </a:r>
+          </a:p>
+        </p:txBody>
+      </p:sp>
+      <p:sp>
+        <p:nvSpPr>
+          <p:cNvPr id="3" name="Inhaltsplatzhalter 2">
+            <a:extLst>
+              <a:ext uri="{FF2B5EF4-FFF2-40B4-BE49-F238E27FC236}">
+                <a16:creationId xmlns:a16="http://schemas.microsoft.com/office/drawing/2014/main" id="{E627C203-A1B7-383D-97A8-56B3248A1E83}"/>
+              </a:ext>
+            </a:extLst>
+          </p:cNvPr>
+          <p:cNvSpPr>
+            <a:spLocks noGrp="1"/>
+          </p:cNvSpPr>
+          <p:nvPr>
+            <p:ph sz="half" idx="1"/>
+          </p:nvPr>
+        </p:nvSpPr>
+        <p:spPr/>
+        <p:txBody>
+          <a:bodyPr>
+            <a:normAutofit/>
+          </a:bodyPr>
+          <a:lstStyle/>
+          <a:p>
+            <a:r>
+              <a:rPr lang="de-DE" noProof="0" dirty="0"/>
+              <a:t>Programmiersprache:</a:t>
+            </a:r>
+          </a:p>
+          <a:p>
+            <a:pPr lvl="1"/>
+            <a:r>
+              <a:rPr lang="de-DE" noProof="0" dirty="0"/>
+              <a:t>C#</a:t>
+            </a:r>
+          </a:p>
+          <a:p>
+            <a:r>
+              <a:rPr lang="de-DE" noProof="0" dirty="0"/>
+              <a:t>Framework:</a:t>
+            </a:r>
+          </a:p>
+          <a:p>
+            <a:pPr lvl="1"/>
+            <a:r>
+              <a:rPr lang="de-DE" noProof="0" dirty="0" err="1"/>
+              <a:t>Blazor</a:t>
+            </a:r>
+            <a:endParaRPr lang="de-DE" noProof="0" dirty="0"/>
+          </a:p>
+          <a:p>
+            <a:r>
+              <a:rPr lang="de-DE" noProof="0" dirty="0"/>
+              <a:t>IDE:</a:t>
+            </a:r>
+          </a:p>
+          <a:p>
+            <a:pPr lvl="1"/>
+            <a:r>
+              <a:rPr lang="de-DE" noProof="0" dirty="0"/>
+              <a:t>Visual Studio</a:t>
             </a:r>
           </a:p>
         </p:txBody>
@@ -7257,117 +8066,62 @@
           <p:cNvPr id="6" name="Inhaltsplatzhalter 5">
             <a:extLst>
               <a:ext uri="{FF2B5EF4-FFF2-40B4-BE49-F238E27FC236}">
-                <a16:creationId xmlns:a16="http://schemas.microsoft.com/office/drawing/2014/main" id="{AF37E05B-D1E7-D5BB-3AA4-0CBC94340331}"/>
-              </a:ext>
-            </a:extLst>
-          </p:cNvPr>
-          <p:cNvSpPr>
-            <a:spLocks noGrp="1"/>
-          </p:cNvSpPr>
-          <p:nvPr>
-            <p:ph sz="half" idx="1"/>
+                <a16:creationId xmlns:a16="http://schemas.microsoft.com/office/drawing/2014/main" id="{7185288F-FFC3-A9CF-5040-625A8A619580}"/>
+              </a:ext>
+            </a:extLst>
+          </p:cNvPr>
+          <p:cNvSpPr>
+            <a:spLocks noGrp="1"/>
+          </p:cNvSpPr>
+          <p:nvPr>
+            <p:ph sz="half" idx="2"/>
           </p:nvPr>
         </p:nvSpPr>
         <p:spPr/>
         <p:txBody>
           <a:bodyPr>
-            <a:normAutofit lnSpcReduction="10000"/>
+            <a:normAutofit/>
           </a:bodyPr>
           <a:lstStyle/>
           <a:p>
             <a:r>
               <a:rPr lang="de-DE" noProof="0" dirty="0"/>
-              <a:t>Eingesetzte SOUPs:</a:t>
+              <a:t>Datenbank:</a:t>
             </a:r>
           </a:p>
           <a:p>
             <a:pPr lvl="1"/>
             <a:r>
               <a:rPr lang="de-DE" noProof="0" dirty="0"/>
-              <a:t>Docker-Container für Hosting der Anwendung</a:t>
+              <a:t>SQLite</a:t>
             </a:r>
           </a:p>
           <a:p>
             <a:r>
               <a:rPr lang="de-DE" noProof="0" dirty="0"/>
-              <a:t>Bibliotheken: </a:t>
+              <a:t>Weitere Tools:</a:t>
             </a:r>
           </a:p>
           <a:p>
             <a:pPr lvl="1"/>
             <a:r>
               <a:rPr lang="de-DE" noProof="0" dirty="0"/>
-              <a:t>[z. B. </a:t>
+              <a:t>Git (Versionierung)</a:t>
+            </a:r>
+          </a:p>
+          <a:p>
+            <a:pPr lvl="1"/>
+            <a:r>
+              <a:rPr lang="de-DE" noProof="0" dirty="0"/>
+              <a:t>Docker (</a:t>
             </a:r>
             <a:r>
               <a:rPr lang="de-DE" noProof="0" dirty="0" err="1"/>
-              <a:t>Newtonsoft.Json</a:t>
+              <a:t>Deployment</a:t>
             </a:r>
             <a:r>
               <a:rPr lang="de-DE" noProof="0" dirty="0"/>
-              <a:t>]</a:t>
-            </a:r>
-          </a:p>
-          <a:p>
-            <a:r>
-              <a:rPr lang="de-DE" noProof="0" dirty="0"/>
-              <a:t>Eingesetzte OTS:</a:t>
-            </a:r>
-          </a:p>
-          <a:p>
-            <a:pPr lvl="1"/>
-            <a:r>
-              <a:rPr lang="de-DE" noProof="0" dirty="0"/>
-              <a:t>.NET 5.0 Framework</a:t>
-            </a:r>
-          </a:p>
-        </p:txBody>
-      </p:sp>
-      <p:sp>
-        <p:nvSpPr>
-          <p:cNvPr id="7" name="Inhaltsplatzhalter 6">
-            <a:extLst>
-              <a:ext uri="{FF2B5EF4-FFF2-40B4-BE49-F238E27FC236}">
-                <a16:creationId xmlns:a16="http://schemas.microsoft.com/office/drawing/2014/main" id="{3BFD40B0-F7F1-F960-F8BC-73901AB54EC1}"/>
-              </a:ext>
-            </a:extLst>
-          </p:cNvPr>
-          <p:cNvSpPr>
-            <a:spLocks noGrp="1"/>
-          </p:cNvSpPr>
-          <p:nvPr>
-            <p:ph sz="half" idx="2"/>
-          </p:nvPr>
-        </p:nvSpPr>
-        <p:spPr/>
-        <p:txBody>
-          <a:bodyPr>
-            <a:normAutofit lnSpcReduction="10000"/>
-          </a:bodyPr>
-          <a:lstStyle/>
-          <a:p>
-            <a:r>
-              <a:rPr lang="de-DE" noProof="0" dirty="0"/>
-              <a:t>SQLite-Datenbank</a:t>
-            </a:r>
-          </a:p>
-          <a:p>
-            <a:r>
-              <a:rPr lang="de-DE" noProof="0" dirty="0"/>
-              <a:t>Visual Studio IDE</a:t>
-            </a:r>
-          </a:p>
-          <a:p>
-            <a:r>
-              <a:rPr lang="de-DE" noProof="0" dirty="0"/>
-              <a:t>Maßnahmen zur Validierung und Sicherstellung:</a:t>
-            </a:r>
-          </a:p>
-          <a:p>
-            <a:pPr lvl="1"/>
-            <a:r>
-              <a:rPr lang="de-DE" noProof="0" dirty="0"/>
-              <a:t>Security-Scans, regelmäßige Updates</a:t>
+              <a:t>)</a:t>
             </a:r>
           </a:p>
         </p:txBody>
@@ -7377,7 +8131,7 @@
           <p:cNvPr id="4" name="Datumsplatzhalter 3">
             <a:extLst>
               <a:ext uri="{FF2B5EF4-FFF2-40B4-BE49-F238E27FC236}">
-                <a16:creationId xmlns:a16="http://schemas.microsoft.com/office/drawing/2014/main" id="{02CC40AD-91C3-625D-A10C-F9A7627732C1}"/>
+                <a16:creationId xmlns:a16="http://schemas.microsoft.com/office/drawing/2014/main" id="{F5985418-FDA1-F1A7-80E8-C25C6BAC324B}"/>
               </a:ext>
             </a:extLst>
           </p:cNvPr>
@@ -7395,7 +8149,7 @@
           <a:p>
             <a:fld id="{42B45B56-1D88-4042-8DF0-EB6B41B710D3}" type="datetime1">
               <a:rPr lang="de-DE" noProof="0" smtClean="0"/>
-              <a:t>11.12.2024</a:t>
+              <a:t>12.12.2024</a:t>
             </a:fld>
             <a:endParaRPr lang="de-DE" noProof="0" dirty="0"/>
           </a:p>
@@ -7406,7 +8160,7 @@
           <p:cNvPr id="5" name="Foliennummernplatzhalter 4">
             <a:extLst>
               <a:ext uri="{FF2B5EF4-FFF2-40B4-BE49-F238E27FC236}">
-                <a16:creationId xmlns:a16="http://schemas.microsoft.com/office/drawing/2014/main" id="{C09C3547-5BE9-9D3D-0D06-22EA64B7A6ED}"/>
+                <a16:creationId xmlns:a16="http://schemas.microsoft.com/office/drawing/2014/main" id="{6A7A11C6-83C4-FA07-F8C7-F2826F8F22B6}"/>
               </a:ext>
             </a:extLst>
           </p:cNvPr>
@@ -7433,7 +8187,7 @@
     </p:spTree>
     <p:extLst>
       <p:ext uri="{BB962C8B-B14F-4D97-AF65-F5344CB8AC3E}">
-        <p14:creationId xmlns:p14="http://schemas.microsoft.com/office/powerpoint/2010/main" val="3169394714"/>
+        <p14:creationId xmlns:p14="http://schemas.microsoft.com/office/powerpoint/2010/main" val="1367875186"/>
       </p:ext>
     </p:extLst>
   </p:cSld>
@@ -7465,7 +8219,7 @@
           <p:cNvPr id="2" name="Titel 1">
             <a:extLst>
               <a:ext uri="{FF2B5EF4-FFF2-40B4-BE49-F238E27FC236}">
-                <a16:creationId xmlns:a16="http://schemas.microsoft.com/office/drawing/2014/main" id="{05F31F6E-2F65-7A93-DF0B-917ABC029378}"/>
+                <a16:creationId xmlns:a16="http://schemas.microsoft.com/office/drawing/2014/main" id="{32CCE440-A4CB-26A7-5B3F-3F9D4B878A95}"/>
               </a:ext>
             </a:extLst>
           </p:cNvPr>
@@ -7481,16 +8235,19 @@
           <a:bodyPr/>
           <a:lstStyle/>
           <a:p>
-            <a:endParaRPr lang="de-DE" noProof="0" dirty="0"/>
-          </a:p>
-        </p:txBody>
-      </p:sp>
-      <p:sp>
-        <p:nvSpPr>
-          <p:cNvPr id="3" name="Inhaltsplatzhalter 2">
-            <a:extLst>
-              <a:ext uri="{FF2B5EF4-FFF2-40B4-BE49-F238E27FC236}">
-                <a16:creationId xmlns:a16="http://schemas.microsoft.com/office/drawing/2014/main" id="{57D7586E-8549-8CEC-FF99-4F32F3A91E62}"/>
+            <a:r>
+              <a:rPr lang="de-DE" noProof="0" dirty="0"/>
+              <a:t>7. SOUPs/OTS</a:t>
+            </a:r>
+          </a:p>
+        </p:txBody>
+      </p:sp>
+      <p:sp>
+        <p:nvSpPr>
+          <p:cNvPr id="6" name="Inhaltsplatzhalter 5">
+            <a:extLst>
+              <a:ext uri="{FF2B5EF4-FFF2-40B4-BE49-F238E27FC236}">
+                <a16:creationId xmlns:a16="http://schemas.microsoft.com/office/drawing/2014/main" id="{AF37E05B-D1E7-D5BB-3AA4-0CBC94340331}"/>
               </a:ext>
             </a:extLst>
           </p:cNvPr>
@@ -7503,62 +8260,132 @@
         </p:nvSpPr>
         <p:spPr/>
         <p:txBody>
+          <a:bodyPr>
+            <a:normAutofit lnSpcReduction="10000"/>
+          </a:bodyPr>
+          <a:lstStyle/>
+          <a:p>
+            <a:r>
+              <a:rPr lang="de-DE" noProof="0" dirty="0"/>
+              <a:t>Eingesetzte SOUPs:</a:t>
+            </a:r>
+          </a:p>
+          <a:p>
+            <a:pPr lvl="1"/>
+            <a:r>
+              <a:rPr lang="de-DE" noProof="0" dirty="0"/>
+              <a:t>Docker-Container für Hosting der Anwendung</a:t>
+            </a:r>
+          </a:p>
+          <a:p>
+            <a:r>
+              <a:rPr lang="de-DE" noProof="0" dirty="0"/>
+              <a:t>Bibliotheken: </a:t>
+            </a:r>
+          </a:p>
+          <a:p>
+            <a:pPr lvl="1"/>
+            <a:r>
+              <a:rPr lang="de-DE" noProof="0" dirty="0"/>
+              <a:t>[z. B. </a:t>
+            </a:r>
+            <a:r>
+              <a:rPr lang="de-DE" noProof="0" dirty="0" err="1"/>
+              <a:t>Newtonsoft.Json</a:t>
+            </a:r>
+            <a:r>
+              <a:rPr lang="de-DE" noProof="0" dirty="0"/>
+              <a:t>]</a:t>
+            </a:r>
+          </a:p>
+          <a:p>
+            <a:r>
+              <a:rPr lang="de-DE" noProof="0" dirty="0"/>
+              <a:t>Eingesetzte OTS:</a:t>
+            </a:r>
+          </a:p>
+          <a:p>
+            <a:pPr lvl="1"/>
+            <a:r>
+              <a:rPr lang="de-DE" noProof="0" dirty="0"/>
+              <a:t>.NET 5.0 Framework</a:t>
+            </a:r>
+          </a:p>
+        </p:txBody>
+      </p:sp>
+      <p:sp>
+        <p:nvSpPr>
+          <p:cNvPr id="7" name="Inhaltsplatzhalter 6">
+            <a:extLst>
+              <a:ext uri="{FF2B5EF4-FFF2-40B4-BE49-F238E27FC236}">
+                <a16:creationId xmlns:a16="http://schemas.microsoft.com/office/drawing/2014/main" id="{3BFD40B0-F7F1-F960-F8BC-73901AB54EC1}"/>
+              </a:ext>
+            </a:extLst>
+          </p:cNvPr>
+          <p:cNvSpPr>
+            <a:spLocks noGrp="1"/>
+          </p:cNvSpPr>
+          <p:nvPr>
+            <p:ph sz="half" idx="2"/>
+          </p:nvPr>
+        </p:nvSpPr>
+        <p:spPr/>
+        <p:txBody>
+          <a:bodyPr>
+            <a:normAutofit lnSpcReduction="10000"/>
+          </a:bodyPr>
+          <a:lstStyle/>
+          <a:p>
+            <a:r>
+              <a:rPr lang="de-DE" noProof="0" dirty="0"/>
+              <a:t>SQLite-Datenbank</a:t>
+            </a:r>
+          </a:p>
+          <a:p>
+            <a:r>
+              <a:rPr lang="de-DE" noProof="0" dirty="0"/>
+              <a:t>Visual Studio IDE</a:t>
+            </a:r>
+          </a:p>
+          <a:p>
+            <a:r>
+              <a:rPr lang="de-DE" noProof="0" dirty="0"/>
+              <a:t>Maßnahmen zur Validierung und Sicherstellung:</a:t>
+            </a:r>
+          </a:p>
+          <a:p>
+            <a:pPr lvl="1"/>
+            <a:r>
+              <a:rPr lang="de-DE" noProof="0" dirty="0"/>
+              <a:t>Security-Scans, regelmäßige Updates</a:t>
+            </a:r>
+          </a:p>
+        </p:txBody>
+      </p:sp>
+      <p:sp>
+        <p:nvSpPr>
+          <p:cNvPr id="4" name="Datumsplatzhalter 3">
+            <a:extLst>
+              <a:ext uri="{FF2B5EF4-FFF2-40B4-BE49-F238E27FC236}">
+                <a16:creationId xmlns:a16="http://schemas.microsoft.com/office/drawing/2014/main" id="{02CC40AD-91C3-625D-A10C-F9A7627732C1}"/>
+              </a:ext>
+            </a:extLst>
+          </p:cNvPr>
+          <p:cNvSpPr>
+            <a:spLocks noGrp="1"/>
+          </p:cNvSpPr>
+          <p:nvPr>
+            <p:ph type="dt" sz="half" idx="10"/>
+          </p:nvPr>
+        </p:nvSpPr>
+        <p:spPr/>
+        <p:txBody>
           <a:bodyPr/>
           <a:lstStyle/>
           <a:p>
-            <a:endParaRPr lang="de-DE" noProof="0" dirty="0"/>
-          </a:p>
-        </p:txBody>
-      </p:sp>
-      <p:sp>
-        <p:nvSpPr>
-          <p:cNvPr id="4" name="Inhaltsplatzhalter 3">
-            <a:extLst>
-              <a:ext uri="{FF2B5EF4-FFF2-40B4-BE49-F238E27FC236}">
-                <a16:creationId xmlns:a16="http://schemas.microsoft.com/office/drawing/2014/main" id="{B737EBE6-E269-7788-70A0-0FBAD540DD56}"/>
-              </a:ext>
-            </a:extLst>
-          </p:cNvPr>
-          <p:cNvSpPr>
-            <a:spLocks noGrp="1"/>
-          </p:cNvSpPr>
-          <p:nvPr>
-            <p:ph sz="half" idx="2"/>
-          </p:nvPr>
-        </p:nvSpPr>
-        <p:spPr/>
-        <p:txBody>
-          <a:bodyPr/>
-          <a:lstStyle/>
-          <a:p>
-            <a:endParaRPr lang="de-DE" noProof="0" dirty="0"/>
-          </a:p>
-        </p:txBody>
-      </p:sp>
-      <p:sp>
-        <p:nvSpPr>
-          <p:cNvPr id="5" name="Datumsplatzhalter 4">
-            <a:extLst>
-              <a:ext uri="{FF2B5EF4-FFF2-40B4-BE49-F238E27FC236}">
-                <a16:creationId xmlns:a16="http://schemas.microsoft.com/office/drawing/2014/main" id="{4D485582-CA74-5996-9B0D-1A4F88AB5AF0}"/>
-              </a:ext>
-            </a:extLst>
-          </p:cNvPr>
-          <p:cNvSpPr>
-            <a:spLocks noGrp="1"/>
-          </p:cNvSpPr>
-          <p:nvPr>
-            <p:ph type="dt" sz="half" idx="10"/>
-          </p:nvPr>
-        </p:nvSpPr>
-        <p:spPr/>
-        <p:txBody>
-          <a:bodyPr/>
-          <a:lstStyle/>
-          <a:p>
-            <a:fld id="{12AE7323-5CDD-4051-9975-1729D84443C7}" type="datetime1">
+            <a:fld id="{42B45B56-1D88-4042-8DF0-EB6B41B710D3}" type="datetime1">
               <a:rPr lang="de-DE" noProof="0" smtClean="0"/>
-              <a:t>11.12.2024</a:t>
+              <a:t>12.12.2024</a:t>
             </a:fld>
             <a:endParaRPr lang="de-DE" noProof="0" dirty="0"/>
           </a:p>
@@ -7566,10 +8393,10 @@
       </p:sp>
       <p:sp>
         <p:nvSpPr>
-          <p:cNvPr id="6" name="Foliennummernplatzhalter 5">
-            <a:extLst>
-              <a:ext uri="{FF2B5EF4-FFF2-40B4-BE49-F238E27FC236}">
-                <a16:creationId xmlns:a16="http://schemas.microsoft.com/office/drawing/2014/main" id="{EFEE860A-9D58-26A0-3548-E7CC6A6E9AEB}"/>
+          <p:cNvPr id="5" name="Foliennummernplatzhalter 4">
+            <a:extLst>
+              <a:ext uri="{FF2B5EF4-FFF2-40B4-BE49-F238E27FC236}">
+                <a16:creationId xmlns:a16="http://schemas.microsoft.com/office/drawing/2014/main" id="{C09C3547-5BE9-9D3D-0D06-22EA64B7A6ED}"/>
               </a:ext>
             </a:extLst>
           </p:cNvPr>
@@ -7596,7 +8423,7 @@
     </p:spTree>
     <p:extLst>
       <p:ext uri="{BB962C8B-B14F-4D97-AF65-F5344CB8AC3E}">
-        <p14:creationId xmlns:p14="http://schemas.microsoft.com/office/powerpoint/2010/main" val="3837604972"/>
+        <p14:creationId xmlns:p14="http://schemas.microsoft.com/office/powerpoint/2010/main" val="3169394714"/>
       </p:ext>
     </p:extLst>
   </p:cSld>
@@ -7611,13 +8438,7 @@
   <p:cSld>
     <p:spTree>
       <p:nvGrpSpPr>
-        <p:cNvPr id="1" name="">
-          <a:extLst>
-            <a:ext uri="{FF2B5EF4-FFF2-40B4-BE49-F238E27FC236}">
-              <a16:creationId xmlns:a16="http://schemas.microsoft.com/office/drawing/2014/main" id="{FAA7904C-22D5-E881-4D01-FB477DA71E5F}"/>
-            </a:ext>
-          </a:extLst>
-        </p:cNvPr>
+        <p:cNvPr id="1" name=""/>
         <p:cNvGrpSpPr/>
         <p:nvPr/>
       </p:nvGrpSpPr>
@@ -7634,7 +8455,7 @@
           <p:cNvPr id="2" name="Titel 1">
             <a:extLst>
               <a:ext uri="{FF2B5EF4-FFF2-40B4-BE49-F238E27FC236}">
-                <a16:creationId xmlns:a16="http://schemas.microsoft.com/office/drawing/2014/main" id="{3BB55E6B-CF2C-CEF3-FF48-47668B162BA5}"/>
+                <a16:creationId xmlns:a16="http://schemas.microsoft.com/office/drawing/2014/main" id="{05F31F6E-2F65-7A93-DF0B-917ABC029378}"/>
               </a:ext>
             </a:extLst>
           </p:cNvPr>
@@ -7651,18 +8472,89 @@
           <a:lstStyle/>
           <a:p>
             <a:r>
-              <a:rPr lang="de-DE" noProof="0" dirty="0"/>
-              <a:t>4. Detailplanung (IST)</a:t>
-            </a:r>
-          </a:p>
-        </p:txBody>
-      </p:sp>
-      <p:sp>
-        <p:nvSpPr>
-          <p:cNvPr id="4" name="Datumsplatzhalter 3">
-            <a:extLst>
-              <a:ext uri="{FF2B5EF4-FFF2-40B4-BE49-F238E27FC236}">
-                <a16:creationId xmlns:a16="http://schemas.microsoft.com/office/drawing/2014/main" id="{27F8B146-19B8-D939-3B88-D8858768AA31}"/>
+              <a:rPr lang="en-US" noProof="0" dirty="0" err="1"/>
+              <a:t>Vielen</a:t>
+            </a:r>
+            <a:r>
+              <a:rPr lang="en-US" noProof="0" dirty="0"/>
+              <a:t> Dank für </a:t>
+            </a:r>
+            <a:r>
+              <a:rPr lang="en-US" noProof="0" dirty="0" err="1"/>
+              <a:t>eure</a:t>
+            </a:r>
+            <a:r>
+              <a:rPr lang="en-US" noProof="0" dirty="0"/>
+              <a:t> </a:t>
+            </a:r>
+            <a:r>
+              <a:rPr lang="en-US" noProof="0" dirty="0" err="1"/>
+              <a:t>Aufmerksamkeit</a:t>
+            </a:r>
+            <a:r>
+              <a:rPr lang="en-US" noProof="0" dirty="0"/>
+              <a:t>!</a:t>
+            </a:r>
+            <a:endParaRPr lang="de-DE" noProof="0" dirty="0"/>
+          </a:p>
+        </p:txBody>
+      </p:sp>
+      <p:sp>
+        <p:nvSpPr>
+          <p:cNvPr id="3" name="Inhaltsplatzhalter 2">
+            <a:extLst>
+              <a:ext uri="{FF2B5EF4-FFF2-40B4-BE49-F238E27FC236}">
+                <a16:creationId xmlns:a16="http://schemas.microsoft.com/office/drawing/2014/main" id="{57D7586E-8549-8CEC-FF99-4F32F3A91E62}"/>
+              </a:ext>
+            </a:extLst>
+          </p:cNvPr>
+          <p:cNvSpPr>
+            <a:spLocks noGrp="1"/>
+          </p:cNvSpPr>
+          <p:nvPr>
+            <p:ph sz="half" idx="1"/>
+          </p:nvPr>
+        </p:nvSpPr>
+        <p:spPr/>
+        <p:txBody>
+          <a:bodyPr/>
+          <a:lstStyle/>
+          <a:p>
+            <a:endParaRPr lang="de-DE" noProof="0" dirty="0"/>
+          </a:p>
+        </p:txBody>
+      </p:sp>
+      <p:sp>
+        <p:nvSpPr>
+          <p:cNvPr id="4" name="Inhaltsplatzhalter 3">
+            <a:extLst>
+              <a:ext uri="{FF2B5EF4-FFF2-40B4-BE49-F238E27FC236}">
+                <a16:creationId xmlns:a16="http://schemas.microsoft.com/office/drawing/2014/main" id="{B737EBE6-E269-7788-70A0-0FBAD540DD56}"/>
+              </a:ext>
+            </a:extLst>
+          </p:cNvPr>
+          <p:cNvSpPr>
+            <a:spLocks noGrp="1"/>
+          </p:cNvSpPr>
+          <p:nvPr>
+            <p:ph sz="half" idx="2"/>
+          </p:nvPr>
+        </p:nvSpPr>
+        <p:spPr/>
+        <p:txBody>
+          <a:bodyPr/>
+          <a:lstStyle/>
+          <a:p>
+            <a:endParaRPr lang="de-DE" noProof="0" dirty="0"/>
+          </a:p>
+        </p:txBody>
+      </p:sp>
+      <p:sp>
+        <p:nvSpPr>
+          <p:cNvPr id="5" name="Datumsplatzhalter 4">
+            <a:extLst>
+              <a:ext uri="{FF2B5EF4-FFF2-40B4-BE49-F238E27FC236}">
+                <a16:creationId xmlns:a16="http://schemas.microsoft.com/office/drawing/2014/main" id="{4D485582-CA74-5996-9B0D-1A4F88AB5AF0}"/>
               </a:ext>
             </a:extLst>
           </p:cNvPr>
@@ -7678,86 +8570,20 @@
           <a:bodyPr/>
           <a:lstStyle/>
           <a:p>
-            <a:pPr marL="0" marR="0" lvl="0" indent="0" algn="r" defTabSz="914400" rtl="0" eaLnBrk="1" fontAlgn="auto" latinLnBrk="0" hangingPunct="1">
-              <a:lnSpc>
-                <a:spcPct val="100000"/>
-              </a:lnSpc>
-              <a:spcBef>
-                <a:spcPts val="0"/>
-              </a:spcBef>
-              <a:spcAft>
-                <a:spcPts val="0"/>
-              </a:spcAft>
-              <a:buClrTx/>
-              <a:buSzTx/>
-              <a:buFontTx/>
-              <a:buNone/>
-              <a:tabLst/>
-              <a:defRPr/>
-            </a:pPr>
-            <a:fld id="{42B45B56-1D88-4042-8DF0-EB6B41B710D3}" type="datetime1">
-              <a:rPr kumimoji="0" lang="de-DE" sz="1200" b="0" i="0" u="none" strike="noStrike" kern="1200" cap="none" spc="0" normalizeH="0" baseline="0" noProof="0" smtClean="0">
-                <a:ln>
-                  <a:noFill/>
-                </a:ln>
-                <a:solidFill>
-                  <a:srgbClr val="FFFFFF">
-                    <a:tint val="75000"/>
-                    <a:alpha val="70000"/>
-                  </a:srgbClr>
-                </a:solidFill>
-                <a:effectLst/>
-                <a:uLnTx/>
-                <a:uFillTx/>
-                <a:latin typeface="Avenir Next LT Pro"/>
-                <a:ea typeface="+mn-ea"/>
-                <a:cs typeface="+mn-cs"/>
-              </a:rPr>
-              <a:pPr marL="0" marR="0" lvl="0" indent="0" algn="r" defTabSz="914400" rtl="0" eaLnBrk="1" fontAlgn="auto" latinLnBrk="0" hangingPunct="1">
-                <a:lnSpc>
-                  <a:spcPct val="100000"/>
-                </a:lnSpc>
-                <a:spcBef>
-                  <a:spcPts val="0"/>
-                </a:spcBef>
-                <a:spcAft>
-                  <a:spcPts val="0"/>
-                </a:spcAft>
-                <a:buClrTx/>
-                <a:buSzTx/>
-                <a:buFontTx/>
-                <a:buNone/>
-                <a:tabLst/>
-                <a:defRPr/>
-              </a:pPr>
-              <a:t>11.12.2024</a:t>
+            <a:fld id="{12AE7323-5CDD-4051-9975-1729D84443C7}" type="datetime1">
+              <a:rPr lang="de-DE" noProof="0" smtClean="0"/>
+              <a:t>12.12.2024</a:t>
             </a:fld>
-            <a:endParaRPr kumimoji="0" lang="de-DE" sz="1200" b="0" i="0" u="none" strike="noStrike" kern="1200" cap="none" spc="0" normalizeH="0" baseline="0" noProof="0" dirty="0">
-              <a:ln>
-                <a:noFill/>
-              </a:ln>
-              <a:solidFill>
-                <a:srgbClr val="FFFFFF">
-                  <a:tint val="75000"/>
-                  <a:alpha val="70000"/>
-                </a:srgbClr>
-              </a:solidFill>
-              <a:effectLst/>
-              <a:uLnTx/>
-              <a:uFillTx/>
-              <a:latin typeface="Avenir Next LT Pro"/>
-              <a:ea typeface="+mn-ea"/>
-              <a:cs typeface="+mn-cs"/>
-            </a:endParaRPr>
-          </a:p>
-        </p:txBody>
-      </p:sp>
-      <p:sp>
-        <p:nvSpPr>
-          <p:cNvPr id="5" name="Foliennummernplatzhalter 4">
-            <a:extLst>
-              <a:ext uri="{FF2B5EF4-FFF2-40B4-BE49-F238E27FC236}">
-                <a16:creationId xmlns:a16="http://schemas.microsoft.com/office/drawing/2014/main" id="{574F4C5D-53C4-AF6F-8676-A07AF5A9C890}"/>
+            <a:endParaRPr lang="de-DE" noProof="0" dirty="0"/>
+          </a:p>
+        </p:txBody>
+      </p:sp>
+      <p:sp>
+        <p:nvSpPr>
+          <p:cNvPr id="6" name="Foliennummernplatzhalter 5">
+            <a:extLst>
+              <a:ext uri="{FF2B5EF4-FFF2-40B4-BE49-F238E27FC236}">
+                <a16:creationId xmlns:a16="http://schemas.microsoft.com/office/drawing/2014/main" id="{EFEE860A-9D58-26A0-3548-E7CC6A6E9AEB}"/>
               </a:ext>
             </a:extLst>
           </p:cNvPr>
@@ -7773,797 +8599,18 @@
           <a:bodyPr/>
           <a:lstStyle/>
           <a:p>
-            <a:pPr marL="0" marR="0" lvl="0" indent="0" algn="r" defTabSz="914400" rtl="0" eaLnBrk="1" fontAlgn="auto" latinLnBrk="0" hangingPunct="1">
-              <a:lnSpc>
-                <a:spcPct val="100000"/>
-              </a:lnSpc>
-              <a:spcBef>
-                <a:spcPts val="0"/>
-              </a:spcBef>
-              <a:spcAft>
-                <a:spcPts val="0"/>
-              </a:spcAft>
-              <a:buClrTx/>
-              <a:buSzTx/>
-              <a:buFontTx/>
-              <a:buNone/>
-              <a:tabLst/>
-              <a:defRPr/>
-            </a:pPr>
             <a:fld id="{07CE569E-9B7C-4CB9-AB80-C0841F922CFF}" type="slidenum">
-              <a:rPr kumimoji="0" lang="de-DE" sz="1200" b="0" i="0" u="none" strike="noStrike" kern="1200" cap="none" spc="0" normalizeH="0" baseline="0" noProof="0" smtClean="0">
-                <a:ln>
-                  <a:noFill/>
-                </a:ln>
-                <a:solidFill>
-                  <a:srgbClr val="FFFFFF">
-                    <a:tint val="75000"/>
-                    <a:alpha val="70000"/>
-                  </a:srgbClr>
-                </a:solidFill>
-                <a:effectLst/>
-                <a:uLnTx/>
-                <a:uFillTx/>
-                <a:latin typeface="Avenir Next LT Pro"/>
-                <a:ea typeface="+mn-ea"/>
-                <a:cs typeface="+mn-cs"/>
-              </a:rPr>
-              <a:pPr marL="0" marR="0" lvl="0" indent="0" algn="r" defTabSz="914400" rtl="0" eaLnBrk="1" fontAlgn="auto" latinLnBrk="0" hangingPunct="1">
-                <a:lnSpc>
-                  <a:spcPct val="100000"/>
-                </a:lnSpc>
-                <a:spcBef>
-                  <a:spcPts val="0"/>
-                </a:spcBef>
-                <a:spcAft>
-                  <a:spcPts val="0"/>
-                </a:spcAft>
-                <a:buClrTx/>
-                <a:buSzTx/>
-                <a:buFontTx/>
-                <a:buNone/>
-                <a:tabLst/>
-                <a:defRPr/>
-              </a:pPr>
+              <a:rPr lang="de-DE" noProof="0" smtClean="0"/>
               <a:t>17</a:t>
             </a:fld>
-            <a:endParaRPr kumimoji="0" lang="de-DE" sz="1200" b="0" i="0" u="none" strike="noStrike" kern="1200" cap="none" spc="0" normalizeH="0" baseline="0" noProof="0" dirty="0">
-              <a:ln>
-                <a:noFill/>
-              </a:ln>
-              <a:solidFill>
-                <a:srgbClr val="FFFFFF">
-                  <a:tint val="75000"/>
-                  <a:alpha val="70000"/>
-                </a:srgbClr>
-              </a:solidFill>
-              <a:effectLst/>
-              <a:uLnTx/>
-              <a:uFillTx/>
-              <a:latin typeface="Avenir Next LT Pro"/>
-              <a:ea typeface="+mn-ea"/>
-              <a:cs typeface="+mn-cs"/>
-            </a:endParaRPr>
-          </a:p>
-        </p:txBody>
-      </p:sp>
-      <p:graphicFrame>
-        <p:nvGraphicFramePr>
-          <p:cNvPr id="3" name="Inhaltsplatzhalter 2">
-            <a:extLst>
-              <a:ext uri="{FF2B5EF4-FFF2-40B4-BE49-F238E27FC236}">
-                <a16:creationId xmlns:a16="http://schemas.microsoft.com/office/drawing/2014/main" id="{5F2698D9-4327-57B7-2C1D-6CF407017E47}"/>
-              </a:ext>
-            </a:extLst>
-          </p:cNvPr>
-          <p:cNvGraphicFramePr>
-            <a:graphicFrameLocks noGrp="1"/>
-          </p:cNvGraphicFramePr>
-          <p:nvPr>
-            <p:ph idx="1"/>
-            <p:extLst>
-              <p:ext uri="{D42A27DB-BD31-4B8C-83A1-F6EECF244321}">
-                <p14:modId xmlns:p14="http://schemas.microsoft.com/office/powerpoint/2010/main" val="3025553376"/>
-              </p:ext>
-            </p:extLst>
-          </p:nvPr>
-        </p:nvGraphicFramePr>
-        <p:xfrm>
-          <a:off x="762000" y="1860487"/>
-          <a:ext cx="8961423" cy="4467451"/>
-        </p:xfrm>
-        <a:graphic>
-          <a:graphicData uri="http://schemas.openxmlformats.org/drawingml/2006/table">
-            <a:tbl>
-              <a:tblPr firstRow="1" bandRow="1">
-                <a:tableStyleId>{5C22544A-7EE6-4342-B048-85BDC9FD1C3A}</a:tableStyleId>
-              </a:tblPr>
-              <a:tblGrid>
-                <a:gridCol w="3810675">
-                  <a:extLst>
-                    <a:ext uri="{9D8B030D-6E8A-4147-A177-3AD203B41FA5}">
-                      <a16:colId xmlns:a16="http://schemas.microsoft.com/office/drawing/2014/main" val="230851902"/>
-                    </a:ext>
-                  </a:extLst>
-                </a:gridCol>
-                <a:gridCol w="2321893">
-                  <a:extLst>
-                    <a:ext uri="{9D8B030D-6E8A-4147-A177-3AD203B41FA5}">
-                      <a16:colId xmlns:a16="http://schemas.microsoft.com/office/drawing/2014/main" val="2657664356"/>
-                    </a:ext>
-                  </a:extLst>
-                </a:gridCol>
-                <a:gridCol w="1733814">
-                  <a:extLst>
-                    <a:ext uri="{9D8B030D-6E8A-4147-A177-3AD203B41FA5}">
-                      <a16:colId xmlns:a16="http://schemas.microsoft.com/office/drawing/2014/main" val="4098082685"/>
-                    </a:ext>
-                  </a:extLst>
-                </a:gridCol>
-                <a:gridCol w="1095041">
-                  <a:extLst>
-                    <a:ext uri="{9D8B030D-6E8A-4147-A177-3AD203B41FA5}">
-                      <a16:colId xmlns:a16="http://schemas.microsoft.com/office/drawing/2014/main" val="2360363224"/>
-                    </a:ext>
-                  </a:extLst>
-                </a:gridCol>
-              </a:tblGrid>
-              <a:tr h="364002">
-                <a:tc>
-                  <a:txBody>
-                    <a:bodyPr/>
-                    <a:lstStyle/>
-                    <a:p>
-                      <a:r>
-                        <a:rPr lang="de-DE" sz="1400" noProof="0" dirty="0"/>
-                        <a:t>Aufgabe</a:t>
-                      </a:r>
-                    </a:p>
-                  </a:txBody>
-                  <a:tcPr/>
-                </a:tc>
-                <a:tc>
-                  <a:txBody>
-                    <a:bodyPr/>
-                    <a:lstStyle/>
-                    <a:p>
-                      <a:r>
-                        <a:rPr lang="de-DE" sz="1400" noProof="0" dirty="0"/>
-                        <a:t>Zuständigkeit</a:t>
-                      </a:r>
-                    </a:p>
-                  </a:txBody>
-                  <a:tcPr/>
-                </a:tc>
-                <a:tc>
-                  <a:txBody>
-                    <a:bodyPr/>
-                    <a:lstStyle/>
-                    <a:p>
-                      <a:r>
-                        <a:rPr lang="de-DE" sz="1400" noProof="0" dirty="0"/>
-                        <a:t>Aufwand</a:t>
-                      </a:r>
-                    </a:p>
-                  </a:txBody>
-                  <a:tcPr/>
-                </a:tc>
-                <a:tc>
-                  <a:txBody>
-                    <a:bodyPr/>
-                    <a:lstStyle/>
-                    <a:p>
-                      <a:r>
-                        <a:rPr lang="de-DE" sz="1400" noProof="0" dirty="0"/>
-                        <a:t>Status</a:t>
-                      </a:r>
-                    </a:p>
-                  </a:txBody>
-                  <a:tcPr/>
-                </a:tc>
-                <a:extLst>
-                  <a:ext uri="{0D108BD9-81ED-4DB2-BD59-A6C34878D82A}">
-                    <a16:rowId xmlns:a16="http://schemas.microsoft.com/office/drawing/2014/main" val="2749238170"/>
-                  </a:ext>
-                </a:extLst>
-              </a:tr>
-              <a:tr h="926116">
-                <a:tc>
-                  <a:txBody>
-                    <a:bodyPr/>
-                    <a:lstStyle/>
-                    <a:p>
-                      <a:r>
-                        <a:rPr lang="de-DE" sz="1400" noProof="0" dirty="0"/>
-                        <a:t>Dokumentation + Project </a:t>
-                      </a:r>
-                      <a:r>
-                        <a:rPr lang="de-DE" sz="1400" noProof="0" dirty="0" err="1"/>
-                        <a:t>Managment</a:t>
-                      </a:r>
-                      <a:endParaRPr lang="de-DE" sz="1400" noProof="0" dirty="0"/>
-                    </a:p>
-                  </a:txBody>
-                  <a:tcPr/>
-                </a:tc>
-                <a:tc>
-                  <a:txBody>
-                    <a:bodyPr/>
-                    <a:lstStyle/>
-                    <a:p>
-                      <a:r>
-                        <a:rPr lang="de-DE" sz="1400" noProof="0" dirty="0"/>
-                        <a:t>Alle</a:t>
-                      </a:r>
-                    </a:p>
-                  </a:txBody>
-                  <a:tcPr/>
-                </a:tc>
-                <a:tc>
-                  <a:txBody>
-                    <a:bodyPr/>
-                    <a:lstStyle/>
-                    <a:p>
-                      <a:r>
-                        <a:rPr lang="de-DE" sz="1400" noProof="0" dirty="0"/>
-                        <a:t>14</a:t>
-                      </a:r>
-                    </a:p>
-                    <a:p>
-                      <a:r>
-                        <a:rPr lang="de-DE" sz="1050" noProof="0" dirty="0"/>
-                        <a:t>(6h Vorbereitung des Sprint)</a:t>
-                      </a:r>
-                    </a:p>
-                  </a:txBody>
-                  <a:tcPr/>
-                </a:tc>
-                <a:tc>
-                  <a:txBody>
-                    <a:bodyPr/>
-                    <a:lstStyle/>
-                    <a:p>
-                      <a:r>
-                        <a:rPr lang="de-DE" sz="1400" noProof="0" dirty="0"/>
-                        <a:t>Erledigt</a:t>
-                      </a:r>
-                    </a:p>
-                  </a:txBody>
-                  <a:tcPr/>
-                </a:tc>
-                <a:extLst>
-                  <a:ext uri="{0D108BD9-81ED-4DB2-BD59-A6C34878D82A}">
-                    <a16:rowId xmlns:a16="http://schemas.microsoft.com/office/drawing/2014/main" val="432160553"/>
-                  </a:ext>
-                </a:extLst>
-              </a:tr>
-              <a:tr h="408804">
-                <a:tc>
-                  <a:txBody>
-                    <a:bodyPr/>
-                    <a:lstStyle/>
-                    <a:p>
-                      <a:r>
-                        <a:rPr lang="de-DE" sz="1400" noProof="0" dirty="0"/>
-                        <a:t>Erstellen Mockups u. Wireframes</a:t>
-                      </a:r>
-                    </a:p>
-                  </a:txBody>
-                  <a:tcPr/>
-                </a:tc>
-                <a:tc>
-                  <a:txBody>
-                    <a:bodyPr/>
-                    <a:lstStyle/>
-                    <a:p>
-                      <a:r>
-                        <a:rPr lang="de-DE" sz="1400" kern="1200" noProof="0" dirty="0">
-                          <a:solidFill>
-                            <a:schemeClr val="dk1"/>
-                          </a:solidFill>
-                          <a:latin typeface="+mn-lt"/>
-                          <a:ea typeface="+mn-ea"/>
-                          <a:cs typeface="+mn-cs"/>
-                        </a:rPr>
-                        <a:t>Vincent Knapp</a:t>
-                      </a:r>
-                    </a:p>
-                  </a:txBody>
-                  <a:tcPr/>
-                </a:tc>
-                <a:tc>
-                  <a:txBody>
-                    <a:bodyPr/>
-                    <a:lstStyle/>
-                    <a:p>
-                      <a:r>
-                        <a:rPr lang="de-DE" sz="1400" kern="1200" noProof="0" dirty="0">
-                          <a:solidFill>
-                            <a:schemeClr val="dk1"/>
-                          </a:solidFill>
-                          <a:latin typeface="+mn-lt"/>
-                          <a:ea typeface="+mn-ea"/>
-                          <a:cs typeface="+mn-cs"/>
-                        </a:rPr>
-                        <a:t>2</a:t>
-                      </a:r>
-                    </a:p>
-                  </a:txBody>
-                  <a:tcPr/>
-                </a:tc>
-                <a:tc>
-                  <a:txBody>
-                    <a:bodyPr/>
-                    <a:lstStyle/>
-                    <a:p>
-                      <a:r>
-                        <a:rPr lang="de-DE" sz="1400" noProof="0" dirty="0"/>
-                        <a:t>Erledigt</a:t>
-                      </a:r>
-                    </a:p>
-                  </a:txBody>
-                  <a:tcPr/>
-                </a:tc>
-                <a:extLst>
-                  <a:ext uri="{0D108BD9-81ED-4DB2-BD59-A6C34878D82A}">
-                    <a16:rowId xmlns:a16="http://schemas.microsoft.com/office/drawing/2014/main" val="739622510"/>
-                  </a:ext>
-                </a:extLst>
-              </a:tr>
-              <a:tr h="506337">
-                <a:tc>
-                  <a:txBody>
-                    <a:bodyPr/>
-                    <a:lstStyle/>
-                    <a:p>
-                      <a:pPr marL="0" marR="0" lvl="0" indent="0" algn="l" defTabSz="914400" rtl="0" eaLnBrk="1" fontAlgn="auto" latinLnBrk="0" hangingPunct="1">
-                        <a:lnSpc>
-                          <a:spcPct val="100000"/>
-                        </a:lnSpc>
-                        <a:spcBef>
-                          <a:spcPts val="0"/>
-                        </a:spcBef>
-                        <a:spcAft>
-                          <a:spcPts val="0"/>
-                        </a:spcAft>
-                        <a:buClrTx/>
-                        <a:buSzTx/>
-                        <a:buFontTx/>
-                        <a:buNone/>
-                        <a:tabLst/>
-                        <a:defRPr/>
-                      </a:pPr>
-                      <a:r>
-                        <a:rPr lang="de-DE" sz="1400" noProof="0" dirty="0"/>
-                        <a:t>Website “Menu-Karte” erstellen</a:t>
-                      </a:r>
-                    </a:p>
-                  </a:txBody>
-                  <a:tcPr/>
-                </a:tc>
-                <a:tc>
-                  <a:txBody>
-                    <a:bodyPr/>
-                    <a:lstStyle/>
-                    <a:p>
-                      <a:r>
-                        <a:rPr lang="de-DE" sz="1400" noProof="0" dirty="0"/>
-                        <a:t>Dennis Haaf</a:t>
-                      </a:r>
-                      <a:br>
-                        <a:rPr lang="de-DE" sz="1400" noProof="0" dirty="0"/>
-                      </a:br>
-                      <a:r>
-                        <a:rPr lang="de-DE" sz="1400" noProof="0" dirty="0"/>
-                        <a:t>Vincent Knapp</a:t>
-                      </a:r>
-                    </a:p>
-                  </a:txBody>
-                  <a:tcPr/>
-                </a:tc>
-                <a:tc>
-                  <a:txBody>
-                    <a:bodyPr/>
-                    <a:lstStyle/>
-                    <a:p>
-                      <a:r>
-                        <a:rPr lang="de-DE" sz="1400" noProof="0" dirty="0"/>
-                        <a:t>8</a:t>
-                      </a:r>
-                    </a:p>
-                  </a:txBody>
-                  <a:tcPr/>
-                </a:tc>
-                <a:tc>
-                  <a:txBody>
-                    <a:bodyPr/>
-                    <a:lstStyle/>
-                    <a:p>
-                      <a:r>
-                        <a:rPr lang="de-DE" sz="1400" noProof="0" dirty="0"/>
-                        <a:t>Erledigt</a:t>
-                      </a:r>
-                    </a:p>
-                  </a:txBody>
-                  <a:tcPr/>
-                </a:tc>
-                <a:extLst>
-                  <a:ext uri="{0D108BD9-81ED-4DB2-BD59-A6C34878D82A}">
-                    <a16:rowId xmlns:a16="http://schemas.microsoft.com/office/drawing/2014/main" val="740267785"/>
-                  </a:ext>
-                </a:extLst>
-              </a:tr>
-              <a:tr h="628278">
-                <a:tc>
-                  <a:txBody>
-                    <a:bodyPr/>
-                    <a:lstStyle/>
-                    <a:p>
-                      <a:r>
-                        <a:rPr lang="de-DE" sz="1400" noProof="0" dirty="0"/>
-                        <a:t>Datenbank “Menu-Karte”</a:t>
-                      </a:r>
-                    </a:p>
-                  </a:txBody>
-                  <a:tcPr/>
-                </a:tc>
-                <a:tc>
-                  <a:txBody>
-                    <a:bodyPr/>
-                    <a:lstStyle/>
-                    <a:p>
-                      <a:r>
-                        <a:rPr lang="de-DE" sz="1400" noProof="0" dirty="0"/>
-                        <a:t>Vincent Knapp</a:t>
-                      </a:r>
-                    </a:p>
-                    <a:p>
-                      <a:r>
-                        <a:rPr lang="de-DE" sz="1400" noProof="0" dirty="0"/>
-                        <a:t>Hans Bloching</a:t>
-                      </a:r>
-                    </a:p>
-                    <a:p>
-                      <a:r>
-                        <a:rPr lang="de-DE" sz="1400" noProof="0" dirty="0"/>
-                        <a:t>Rene Weber</a:t>
-                      </a:r>
-                    </a:p>
-                  </a:txBody>
-                  <a:tcPr/>
-                </a:tc>
-                <a:tc>
-                  <a:txBody>
-                    <a:bodyPr/>
-                    <a:lstStyle/>
-                    <a:p>
-                      <a:r>
-                        <a:rPr lang="de-DE" sz="1400" noProof="0" dirty="0"/>
-                        <a:t>1,5</a:t>
-                      </a:r>
-                    </a:p>
-                  </a:txBody>
-                  <a:tcPr/>
-                </a:tc>
-                <a:tc>
-                  <a:txBody>
-                    <a:bodyPr/>
-                    <a:lstStyle/>
-                    <a:p>
-                      <a:r>
-                        <a:rPr lang="de-DE" sz="1400" noProof="0" dirty="0"/>
-                        <a:t>Erledigt</a:t>
-                      </a:r>
-                    </a:p>
-                  </a:txBody>
-                  <a:tcPr/>
-                </a:tc>
-                <a:extLst>
-                  <a:ext uri="{0D108BD9-81ED-4DB2-BD59-A6C34878D82A}">
-                    <a16:rowId xmlns:a16="http://schemas.microsoft.com/office/drawing/2014/main" val="2603736860"/>
-                  </a:ext>
-                </a:extLst>
-              </a:tr>
-              <a:tr h="482529">
-                <a:tc>
-                  <a:txBody>
-                    <a:bodyPr/>
-                    <a:lstStyle/>
-                    <a:p>
-                      <a:r>
-                        <a:rPr lang="de-DE" sz="1400" noProof="0" dirty="0"/>
-                        <a:t>Einführung in </a:t>
-                      </a:r>
-                      <a:r>
-                        <a:rPr lang="de-DE" sz="1400" noProof="0" dirty="0" err="1"/>
-                        <a:t>Blazor</a:t>
-                      </a:r>
-                      <a:r>
-                        <a:rPr lang="de-DE" sz="1400" noProof="0" dirty="0"/>
-                        <a:t> und C# Coding</a:t>
-                      </a:r>
-                    </a:p>
-                  </a:txBody>
-                  <a:tcPr/>
-                </a:tc>
-                <a:tc>
-                  <a:txBody>
-                    <a:bodyPr/>
-                    <a:lstStyle/>
-                    <a:p>
-                      <a:r>
-                        <a:rPr lang="de-DE" sz="1400" noProof="0" dirty="0"/>
-                        <a:t>Alle</a:t>
-                      </a:r>
-                    </a:p>
-                  </a:txBody>
-                  <a:tcPr/>
-                </a:tc>
-                <a:tc>
-                  <a:txBody>
-                    <a:bodyPr/>
-                    <a:lstStyle/>
-                    <a:p>
-                      <a:r>
-                        <a:rPr lang="de-DE" sz="1400" noProof="0" dirty="0"/>
-                        <a:t>4</a:t>
-                      </a:r>
-                    </a:p>
-                  </a:txBody>
-                  <a:tcPr/>
-                </a:tc>
-                <a:tc>
-                  <a:txBody>
-                    <a:bodyPr/>
-                    <a:lstStyle/>
-                    <a:p>
-                      <a:r>
-                        <a:rPr lang="de-DE" sz="1400" noProof="0" dirty="0"/>
-                        <a:t>Erledigt</a:t>
-                      </a:r>
-                    </a:p>
-                  </a:txBody>
-                  <a:tcPr/>
-                </a:tc>
-                <a:extLst>
-                  <a:ext uri="{0D108BD9-81ED-4DB2-BD59-A6C34878D82A}">
-                    <a16:rowId xmlns:a16="http://schemas.microsoft.com/office/drawing/2014/main" val="4252090113"/>
-                  </a:ext>
-                </a:extLst>
-              </a:tr>
-              <a:tr h="488887">
-                <a:tc>
-                  <a:txBody>
-                    <a:bodyPr/>
-                    <a:lstStyle/>
-                    <a:p>
-                      <a:r>
-                        <a:rPr lang="de-DE" sz="1400" noProof="0" dirty="0"/>
-                        <a:t>Website “Warenkorb”</a:t>
-                      </a:r>
-                    </a:p>
-                  </a:txBody>
-                  <a:tcPr/>
-                </a:tc>
-                <a:tc>
-                  <a:txBody>
-                    <a:bodyPr/>
-                    <a:lstStyle/>
-                    <a:p>
-                      <a:r>
-                        <a:rPr lang="de-DE" sz="1400" noProof="0" dirty="0"/>
-                        <a:t>Hans Bloching</a:t>
-                      </a:r>
-                    </a:p>
-                    <a:p>
-                      <a:r>
-                        <a:rPr lang="de-DE" sz="1400" noProof="0" dirty="0"/>
-                        <a:t>Rene Weber</a:t>
-                      </a:r>
-                    </a:p>
-                  </a:txBody>
-                  <a:tcPr/>
-                </a:tc>
-                <a:tc>
-                  <a:txBody>
-                    <a:bodyPr/>
-                    <a:lstStyle/>
-                    <a:p>
-                      <a:r>
-                        <a:rPr lang="de-DE" sz="1400" noProof="0" dirty="0"/>
-                        <a:t>4</a:t>
-                      </a:r>
-                    </a:p>
-                  </a:txBody>
-                  <a:tcPr/>
-                </a:tc>
-                <a:tc>
-                  <a:txBody>
-                    <a:bodyPr/>
-                    <a:lstStyle/>
-                    <a:p>
-                      <a:r>
-                        <a:rPr lang="de-DE" sz="1400" noProof="0" dirty="0"/>
-                        <a:t>In Arbeit</a:t>
-                      </a:r>
-                    </a:p>
-                  </a:txBody>
-                  <a:tcPr/>
-                </a:tc>
-                <a:extLst>
-                  <a:ext uri="{0D108BD9-81ED-4DB2-BD59-A6C34878D82A}">
-                    <a16:rowId xmlns:a16="http://schemas.microsoft.com/office/drawing/2014/main" val="1091053033"/>
-                  </a:ext>
-                </a:extLst>
-              </a:tr>
-              <a:tr h="450561">
-                <a:tc>
-                  <a:txBody>
-                    <a:bodyPr/>
-                    <a:lstStyle/>
-                    <a:p>
-                      <a:r>
-                        <a:rPr lang="de-DE" sz="1400" noProof="0" dirty="0"/>
-                        <a:t>Datenbank “Warenkorb/Bestellungen”</a:t>
-                      </a:r>
-                    </a:p>
-                  </a:txBody>
-                  <a:tcPr/>
-                </a:tc>
-                <a:tc>
-                  <a:txBody>
-                    <a:bodyPr/>
-                    <a:lstStyle/>
-                    <a:p>
-                      <a:r>
-                        <a:rPr lang="de-DE" sz="1400" noProof="0" dirty="0"/>
-                        <a:t>Hans Bloching</a:t>
-                      </a:r>
-                    </a:p>
-                    <a:p>
-                      <a:r>
-                        <a:rPr lang="de-DE" sz="1400" noProof="0" dirty="0"/>
-                        <a:t>Rene Weber</a:t>
-                      </a:r>
-                    </a:p>
-                  </a:txBody>
-                  <a:tcPr/>
-                </a:tc>
-                <a:tc>
-                  <a:txBody>
-                    <a:bodyPr/>
-                    <a:lstStyle/>
-                    <a:p>
-                      <a:r>
-                        <a:rPr lang="de-DE" sz="1400" noProof="0" dirty="0"/>
-                        <a:t>0,5</a:t>
-                      </a:r>
-                    </a:p>
-                  </a:txBody>
-                  <a:tcPr/>
-                </a:tc>
-                <a:tc>
-                  <a:txBody>
-                    <a:bodyPr/>
-                    <a:lstStyle/>
-                    <a:p>
-                      <a:r>
-                        <a:rPr lang="de-DE" sz="1400" noProof="0" dirty="0"/>
-                        <a:t>In Arbeit</a:t>
-                      </a:r>
-                    </a:p>
-                  </a:txBody>
-                  <a:tcPr/>
-                </a:tc>
-                <a:extLst>
-                  <a:ext uri="{0D108BD9-81ED-4DB2-BD59-A6C34878D82A}">
-                    <a16:rowId xmlns:a16="http://schemas.microsoft.com/office/drawing/2014/main" val="2446957633"/>
-                  </a:ext>
-                </a:extLst>
-              </a:tr>
-            </a:tbl>
-          </a:graphicData>
-        </a:graphic>
-      </p:graphicFrame>
-      <p:pic>
-        <p:nvPicPr>
-          <p:cNvPr id="7" name="Grafik 6">
-            <a:extLst>
-              <a:ext uri="{FF2B5EF4-FFF2-40B4-BE49-F238E27FC236}">
-                <a16:creationId xmlns:a16="http://schemas.microsoft.com/office/drawing/2014/main" id="{B19F4647-42D3-96AA-571E-B5F63F9ABC18}"/>
-              </a:ext>
-            </a:extLst>
-          </p:cNvPr>
-          <p:cNvPicPr>
-            <a:picLocks noChangeAspect="1"/>
-          </p:cNvPicPr>
-          <p:nvPr/>
-        </p:nvPicPr>
-        <p:blipFill>
-          <a:blip r:embed="rId2"/>
-          <a:stretch>
-            <a:fillRect/>
-          </a:stretch>
-        </p:blipFill>
-        <p:spPr>
-          <a:xfrm>
-            <a:off x="6884925" y="6278906"/>
-            <a:ext cx="1738967" cy="451906"/>
-          </a:xfrm>
-          <a:prstGeom prst="rect">
-            <a:avLst/>
-          </a:prstGeom>
-        </p:spPr>
-      </p:pic>
-      <p:sp>
-        <p:nvSpPr>
-          <p:cNvPr id="12" name="Textfeld 11">
-            <a:extLst>
-              <a:ext uri="{FF2B5EF4-FFF2-40B4-BE49-F238E27FC236}">
-                <a16:creationId xmlns:a16="http://schemas.microsoft.com/office/drawing/2014/main" id="{71644E0E-780A-3A6B-636B-4E077AB50B8C}"/>
-              </a:ext>
-            </a:extLst>
-          </p:cNvPr>
-          <p:cNvSpPr txBox="1"/>
-          <p:nvPr/>
-        </p:nvSpPr>
-        <p:spPr>
-          <a:xfrm>
-            <a:off x="6884925" y="6327056"/>
-            <a:ext cx="1524000" cy="369332"/>
-          </a:xfrm>
-          <a:prstGeom prst="rect">
-            <a:avLst/>
-          </a:prstGeom>
-          <a:noFill/>
-        </p:spPr>
-        <p:txBody>
-          <a:bodyPr wrap="square" rtlCol="0">
-            <a:spAutoFit/>
-          </a:bodyPr>
-          <a:lstStyle/>
-          <a:p>
-            <a:pPr marL="0" marR="0" lvl="0" indent="0" algn="l" defTabSz="914400" rtl="0" eaLnBrk="1" fontAlgn="auto" latinLnBrk="0" hangingPunct="1">
-              <a:lnSpc>
-                <a:spcPct val="100000"/>
-              </a:lnSpc>
-              <a:spcBef>
-                <a:spcPts val="0"/>
-              </a:spcBef>
-              <a:spcAft>
-                <a:spcPts val="0"/>
-              </a:spcAft>
-              <a:buClrTx/>
-              <a:buSzTx/>
-              <a:buFontTx/>
-              <a:buNone/>
-              <a:tabLst/>
-              <a:defRPr/>
-            </a:pPr>
-            <a:r>
-              <a:rPr kumimoji="0" lang="de-DE" sz="1800" b="0" i="0" u="none" strike="noStrike" kern="1200" cap="none" spc="0" normalizeH="0" baseline="0" noProof="0" dirty="0">
-                <a:ln>
-                  <a:noFill/>
-                </a:ln>
-                <a:solidFill>
-                  <a:srgbClr val="000000"/>
-                </a:solidFill>
-                <a:effectLst/>
-                <a:uLnTx/>
-                <a:uFillTx/>
-                <a:latin typeface="Avenir Next LT Pro"/>
-                <a:ea typeface="+mn-ea"/>
-                <a:cs typeface="+mn-cs"/>
-              </a:rPr>
-              <a:t>34</a:t>
-            </a:r>
+            <a:endParaRPr lang="de-DE" noProof="0" dirty="0"/>
           </a:p>
         </p:txBody>
       </p:sp>
     </p:spTree>
     <p:extLst>
       <p:ext uri="{BB962C8B-B14F-4D97-AF65-F5344CB8AC3E}">
-        <p14:creationId xmlns:p14="http://schemas.microsoft.com/office/powerpoint/2010/main" val="1079743533"/>
+        <p14:creationId xmlns:p14="http://schemas.microsoft.com/office/powerpoint/2010/main" val="3837604972"/>
       </p:ext>
     </p:extLst>
   </p:cSld>
@@ -8735,7 +8782,7 @@
           <a:p>
             <a:fld id="{AE5E781B-AB27-45A9-B2F3-7F70593BE83B}" type="datetime1">
               <a:rPr lang="de-DE" noProof="0" smtClean="0"/>
-              <a:t>11.12.2024</a:t>
+              <a:t>12.12.2024</a:t>
             </a:fld>
             <a:endParaRPr lang="de-DE" noProof="0" dirty="0"/>
           </a:p>
@@ -8851,7 +8898,7 @@
           <a:p>
             <a:fld id="{42B45B56-1D88-4042-8DF0-EB6B41B710D3}" type="datetime1">
               <a:rPr lang="de-DE" noProof="0" smtClean="0"/>
-              <a:t>11.12.2024</a:t>
+              <a:t>12.12.2024</a:t>
             </a:fld>
             <a:endParaRPr lang="de-DE" noProof="0" dirty="0"/>
           </a:p>
@@ -9460,6 +9507,18 @@
             </a:r>
           </a:p>
           <a:p>
+            <a:r>
+              <a:rPr lang="de-DE" sz="2400" dirty="0"/>
+              <a:t>Anbindung API.</a:t>
+            </a:r>
+          </a:p>
+          <a:p>
+            <a:r>
+              <a:rPr lang="de-DE" sz="2400" dirty="0"/>
+              <a:t>(evtl. Küchenansicht optimieren).</a:t>
+            </a:r>
+          </a:p>
+          <a:p>
             <a:endParaRPr lang="de-DE" dirty="0"/>
           </a:p>
         </p:txBody>
@@ -9551,7 +9610,7 @@
           <a:p>
             <a:fld id="{75919FF8-1369-4F22-8739-0971D22D8076}" type="datetime1">
               <a:rPr lang="de-DE" smtClean="0"/>
-              <a:t>11.12.2024</a:t>
+              <a:t>12.12.2024</a:t>
             </a:fld>
             <a:endParaRPr lang="en-US"/>
           </a:p>
@@ -9667,7 +9726,7 @@
           <a:p>
             <a:fld id="{42B45B56-1D88-4042-8DF0-EB6B41B710D3}" type="datetime1">
               <a:rPr lang="de-DE" noProof="0" smtClean="0"/>
-              <a:t>11.12.2024</a:t>
+              <a:t>12.12.2024</a:t>
             </a:fld>
             <a:endParaRPr lang="de-DE" noProof="0" dirty="0"/>
           </a:p>
@@ -10164,7 +10223,7 @@
           <a:p>
             <a:fld id="{42B45B56-1D88-4042-8DF0-EB6B41B710D3}" type="datetime1">
               <a:rPr lang="de-DE" noProof="0" smtClean="0"/>
-              <a:t>11.12.2024</a:t>
+              <a:t>12.12.2024</a:t>
             </a:fld>
             <a:endParaRPr lang="de-DE" noProof="0" dirty="0"/>
           </a:p>
@@ -10311,7 +10370,7 @@
           <a:p>
             <a:fld id="{42B45B56-1D88-4042-8DF0-EB6B41B710D3}" type="datetime1">
               <a:rPr lang="de-DE" noProof="0" smtClean="0"/>
-              <a:t>11.12.2024</a:t>
+              <a:t>12.12.2024</a:t>
             </a:fld>
             <a:endParaRPr lang="de-DE" noProof="0" dirty="0"/>
           </a:p>
@@ -10426,7 +10485,11 @@
           <a:bodyPr/>
           <a:lstStyle/>
           <a:p>
-            <a:endParaRPr lang="de-DE"/>
+            <a:r>
+              <a:rPr lang="de-DE" noProof="0" dirty="0"/>
+              <a:t>3. Produktzwischenstand</a:t>
+            </a:r>
+            <a:endParaRPr lang="de-DE" dirty="0"/>
           </a:p>
         </p:txBody>
       </p:sp>
@@ -10454,7 +10517,7 @@
         </p:blipFill>
         <p:spPr>
           <a:xfrm>
-            <a:off x="2181225" y="2810845"/>
+            <a:off x="3359512" y="3145429"/>
             <a:ext cx="2312988" cy="2760310"/>
           </a:xfrm>
         </p:spPr>
@@ -10511,7 +10574,7 @@
           <a:p>
             <a:fld id="{12AE7323-5CDD-4051-9975-1729D84443C7}" type="datetime1">
               <a:rPr lang="de-DE" smtClean="0"/>
-              <a:t>11.12.2024</a:t>
+              <a:t>12.12.2024</a:t>
             </a:fld>
             <a:endParaRPr lang="en-US"/>
           </a:p>
@@ -10543,6 +10606,54 @@
               <a:t>8</a:t>
             </a:fld>
             <a:endParaRPr lang="en-US"/>
+          </a:p>
+        </p:txBody>
+      </p:sp>
+      <p:sp>
+        <p:nvSpPr>
+          <p:cNvPr id="3" name="Textfeld 2">
+            <a:extLst>
+              <a:ext uri="{FF2B5EF4-FFF2-40B4-BE49-F238E27FC236}">
+                <a16:creationId xmlns:a16="http://schemas.microsoft.com/office/drawing/2014/main" id="{D9DF8A3A-B0A3-6DF4-3436-4938E6B4F2B5}"/>
+              </a:ext>
+            </a:extLst>
+          </p:cNvPr>
+          <p:cNvSpPr txBox="1"/>
+          <p:nvPr/>
+        </p:nvSpPr>
+        <p:spPr>
+          <a:xfrm>
+            <a:off x="1245793" y="2684065"/>
+            <a:ext cx="6026448" cy="369332"/>
+          </a:xfrm>
+          <a:prstGeom prst="rect">
+            <a:avLst/>
+          </a:prstGeom>
+          <a:noFill/>
+        </p:spPr>
+        <p:txBody>
+          <a:bodyPr wrap="square" rtlCol="0">
+            <a:spAutoFit/>
+          </a:bodyPr>
+          <a:lstStyle/>
+          <a:p>
+            <a:r>
+              <a:rPr lang="en-US" b="1" dirty="0"/>
+              <a:t>Login für </a:t>
+            </a:r>
+            <a:r>
+              <a:rPr lang="en-US" b="1" dirty="0" err="1"/>
+              <a:t>Küchen</a:t>
+            </a:r>
+            <a:r>
+              <a:rPr lang="en-US" b="1" dirty="0"/>
+              <a:t>-Mitarbeiter + </a:t>
+            </a:r>
+            <a:r>
+              <a:rPr lang="en-US" b="1" dirty="0" err="1"/>
+              <a:t>Küchen-Ansicht</a:t>
+            </a:r>
+            <a:endParaRPr lang="de-DE" b="1" dirty="0"/>
           </a:p>
         </p:txBody>
       </p:sp>
@@ -10576,46 +10687,19 @@
           <a:chExt cx="0" cy="0"/>
         </a:xfrm>
       </p:grpSpPr>
-      <p:sp>
-        <p:nvSpPr>
-          <p:cNvPr id="2" name="Titel 1">
-            <a:extLst>
-              <a:ext uri="{FF2B5EF4-FFF2-40B4-BE49-F238E27FC236}">
-                <a16:creationId xmlns:a16="http://schemas.microsoft.com/office/drawing/2014/main" id="{1B93A12F-1CA4-1BAA-AF57-924F60F11732}"/>
-              </a:ext>
-            </a:extLst>
-          </p:cNvPr>
-          <p:cNvSpPr>
-            <a:spLocks noGrp="1"/>
-          </p:cNvSpPr>
-          <p:nvPr>
-            <p:ph type="title"/>
-          </p:nvPr>
-        </p:nvSpPr>
-        <p:spPr/>
-        <p:txBody>
-          <a:bodyPr/>
-          <a:lstStyle/>
-          <a:p>
-            <a:endParaRPr lang="de-DE"/>
-          </a:p>
-        </p:txBody>
-      </p:sp>
       <p:pic>
         <p:nvPicPr>
-          <p:cNvPr id="8" name="Inhaltsplatzhalter 7">
-            <a:extLst>
-              <a:ext uri="{FF2B5EF4-FFF2-40B4-BE49-F238E27FC236}">
-                <a16:creationId xmlns:a16="http://schemas.microsoft.com/office/drawing/2014/main" id="{6013533E-10F3-8ACB-2FEC-DC3258599405}"/>
+          <p:cNvPr id="11" name="Grafik 10">
+            <a:extLst>
+              <a:ext uri="{FF2B5EF4-FFF2-40B4-BE49-F238E27FC236}">
+                <a16:creationId xmlns:a16="http://schemas.microsoft.com/office/drawing/2014/main" id="{FE9A0FCD-5FE1-D6D4-1488-1A6CB12FF2A5}"/>
               </a:ext>
             </a:extLst>
           </p:cNvPr>
           <p:cNvPicPr>
-            <a:picLocks noGrp="1" noChangeAspect="1"/>
+            <a:picLocks noChangeAspect="1"/>
           </p:cNvPicPr>
-          <p:nvPr>
-            <p:ph sz="half" idx="1"/>
-          </p:nvPr>
+          <p:nvPr/>
         </p:nvPicPr>
         <p:blipFill>
           <a:blip r:embed="rId2"/>
@@ -10625,38 +10709,45 @@
         </p:blipFill>
         <p:spPr>
           <a:xfrm>
-            <a:off x="2043491" y="2438400"/>
+            <a:off x="957389" y="3002985"/>
+            <a:ext cx="4058484" cy="2792305"/>
+          </a:xfrm>
+          <a:prstGeom prst="rect">
+            <a:avLst/>
+          </a:prstGeom>
+        </p:spPr>
+      </p:pic>
+      <p:pic>
+        <p:nvPicPr>
+          <p:cNvPr id="8" name="Inhaltsplatzhalter 7">
+            <a:extLst>
+              <a:ext uri="{FF2B5EF4-FFF2-40B4-BE49-F238E27FC236}">
+                <a16:creationId xmlns:a16="http://schemas.microsoft.com/office/drawing/2014/main" id="{6013533E-10F3-8ACB-2FEC-DC3258599405}"/>
+              </a:ext>
+            </a:extLst>
+          </p:cNvPr>
+          <p:cNvPicPr>
+            <a:picLocks noGrp="1" noChangeAspect="1"/>
+          </p:cNvPicPr>
+          <p:nvPr>
+            <p:ph sz="half" idx="1"/>
+          </p:nvPr>
+        </p:nvPicPr>
+        <p:blipFill>
+          <a:blip r:embed="rId3"/>
+          <a:stretch>
+            <a:fillRect/>
+          </a:stretch>
+        </p:blipFill>
+        <p:spPr>
+          <a:xfrm>
+            <a:off x="6800709" y="2646537"/>
             <a:ext cx="2588456" cy="3505200"/>
           </a:xfrm>
         </p:spPr>
       </p:pic>
       <p:sp>
         <p:nvSpPr>
-          <p:cNvPr id="4" name="Inhaltsplatzhalter 3">
-            <a:extLst>
-              <a:ext uri="{FF2B5EF4-FFF2-40B4-BE49-F238E27FC236}">
-                <a16:creationId xmlns:a16="http://schemas.microsoft.com/office/drawing/2014/main" id="{79CE6463-9713-CB23-8A62-A6EA9DB5FE4F}"/>
-              </a:ext>
-            </a:extLst>
-          </p:cNvPr>
-          <p:cNvSpPr>
-            <a:spLocks noGrp="1"/>
-          </p:cNvSpPr>
-          <p:nvPr>
-            <p:ph sz="half" idx="2"/>
-          </p:nvPr>
-        </p:nvSpPr>
-        <p:spPr/>
-        <p:txBody>
-          <a:bodyPr/>
-          <a:lstStyle/>
-          <a:p>
-            <a:endParaRPr lang="de-DE" dirty="0"/>
-          </a:p>
-        </p:txBody>
-      </p:sp>
-      <p:sp>
-        <p:nvSpPr>
           <p:cNvPr id="5" name="Datumsplatzhalter 4">
             <a:extLst>
               <a:ext uri="{FF2B5EF4-FFF2-40B4-BE49-F238E27FC236}">
@@ -10678,7 +10769,7 @@
           <a:p>
             <a:fld id="{12AE7323-5CDD-4051-9975-1729D84443C7}" type="datetime1">
               <a:rPr lang="de-DE" smtClean="0"/>
-              <a:t>11.12.2024</a:t>
+              <a:t>12.12.2024</a:t>
             </a:fld>
             <a:endParaRPr lang="en-US"/>
           </a:p>
@@ -10710,6 +10801,184 @@
               <a:t>9</a:t>
             </a:fld>
             <a:endParaRPr lang="en-US"/>
+          </a:p>
+        </p:txBody>
+      </p:sp>
+      <p:cxnSp>
+        <p:nvCxnSpPr>
+          <p:cNvPr id="7" name="Gerade Verbindung mit Pfeil 6">
+            <a:extLst>
+              <a:ext uri="{FF2B5EF4-FFF2-40B4-BE49-F238E27FC236}">
+                <a16:creationId xmlns:a16="http://schemas.microsoft.com/office/drawing/2014/main" id="{37FD134E-9D05-4999-A25C-C8CF34F9468B}"/>
+              </a:ext>
+            </a:extLst>
+          </p:cNvPr>
+          <p:cNvCxnSpPr>
+            <a:cxnSpLocks/>
+          </p:cNvCxnSpPr>
+          <p:nvPr/>
+        </p:nvCxnSpPr>
+        <p:spPr>
+          <a:xfrm flipV="1">
+            <a:off x="4940215" y="3522588"/>
+            <a:ext cx="2430217" cy="650513"/>
+          </a:xfrm>
+          <a:prstGeom prst="straightConnector1">
+            <a:avLst/>
+          </a:prstGeom>
+          <a:ln w="28575">
+            <a:solidFill>
+              <a:srgbClr val="FF0000"/>
+            </a:solidFill>
+            <a:tailEnd type="triangle"/>
+          </a:ln>
+        </p:spPr>
+        <p:style>
+          <a:lnRef idx="1">
+            <a:schemeClr val="accent1"/>
+          </a:lnRef>
+          <a:fillRef idx="0">
+            <a:schemeClr val="accent1"/>
+          </a:fillRef>
+          <a:effectRef idx="0">
+            <a:schemeClr val="accent1"/>
+          </a:effectRef>
+          <a:fontRef idx="minor">
+            <a:schemeClr val="tx1"/>
+          </a:fontRef>
+        </p:style>
+      </p:cxnSp>
+      <p:sp>
+        <p:nvSpPr>
+          <p:cNvPr id="12" name="Rechteck 11">
+            <a:extLst>
+              <a:ext uri="{FF2B5EF4-FFF2-40B4-BE49-F238E27FC236}">
+                <a16:creationId xmlns:a16="http://schemas.microsoft.com/office/drawing/2014/main" id="{FDCC6A87-D090-B124-0FD0-38D9706447C8}"/>
+              </a:ext>
+            </a:extLst>
+          </p:cNvPr>
+          <p:cNvSpPr/>
+          <p:nvPr/>
+        </p:nvSpPr>
+        <p:spPr>
+          <a:xfrm>
+            <a:off x="4486083" y="3002985"/>
+            <a:ext cx="386625" cy="2749337"/>
+          </a:xfrm>
+          <a:prstGeom prst="rect">
+            <a:avLst/>
+          </a:prstGeom>
+          <a:noFill/>
+          <a:ln w="28575">
+            <a:solidFill>
+              <a:srgbClr val="FF0000"/>
+            </a:solidFill>
+          </a:ln>
+        </p:spPr>
+        <p:style>
+          <a:lnRef idx="2">
+            <a:schemeClr val="accent1">
+              <a:shade val="15000"/>
+            </a:schemeClr>
+          </a:lnRef>
+          <a:fillRef idx="1">
+            <a:schemeClr val="accent1"/>
+          </a:fillRef>
+          <a:effectRef idx="0">
+            <a:schemeClr val="accent1"/>
+          </a:effectRef>
+          <a:fontRef idx="minor">
+            <a:schemeClr val="lt1"/>
+          </a:fontRef>
+        </p:style>
+        <p:txBody>
+          <a:bodyPr rtlCol="0" anchor="ctr"/>
+          <a:lstStyle/>
+          <a:p>
+            <a:pPr algn="ctr"/>
+            <a:endParaRPr lang="de-DE"/>
+          </a:p>
+        </p:txBody>
+      </p:sp>
+      <p:sp>
+        <p:nvSpPr>
+          <p:cNvPr id="16" name="Textfeld 15">
+            <a:extLst>
+              <a:ext uri="{FF2B5EF4-FFF2-40B4-BE49-F238E27FC236}">
+                <a16:creationId xmlns:a16="http://schemas.microsoft.com/office/drawing/2014/main" id="{3FEE51D1-14AA-8F50-D4F4-7F98825609E8}"/>
+              </a:ext>
+            </a:extLst>
+          </p:cNvPr>
+          <p:cNvSpPr txBox="1"/>
+          <p:nvPr/>
+        </p:nvSpPr>
+        <p:spPr>
+          <a:xfrm>
+            <a:off x="1601733" y="2373852"/>
+            <a:ext cx="3270975" cy="369332"/>
+          </a:xfrm>
+          <a:prstGeom prst="rect">
+            <a:avLst/>
+          </a:prstGeom>
+          <a:noFill/>
+        </p:spPr>
+        <p:txBody>
+          <a:bodyPr wrap="square" rtlCol="0">
+            <a:spAutoFit/>
+          </a:bodyPr>
+          <a:lstStyle/>
+          <a:p>
+            <a:r>
+              <a:rPr lang="en-US" b="1" dirty="0"/>
+              <a:t>“</a:t>
+            </a:r>
+            <a:r>
+              <a:rPr lang="en-US" b="1" dirty="0" err="1"/>
+              <a:t>klassische</a:t>
+            </a:r>
+            <a:r>
+              <a:rPr lang="en-US" b="1" dirty="0"/>
+              <a:t>” </a:t>
+            </a:r>
+            <a:r>
+              <a:rPr lang="en-US" b="1" dirty="0" err="1"/>
+              <a:t>Probleme</a:t>
+            </a:r>
+            <a:endParaRPr lang="de-DE" b="1" dirty="0"/>
+          </a:p>
+        </p:txBody>
+      </p:sp>
+      <p:sp>
+        <p:nvSpPr>
+          <p:cNvPr id="17" name="Titel 1">
+            <a:extLst>
+              <a:ext uri="{FF2B5EF4-FFF2-40B4-BE49-F238E27FC236}">
+                <a16:creationId xmlns:a16="http://schemas.microsoft.com/office/drawing/2014/main" id="{9D0596BB-A368-19AC-99B9-B074A422EC3F}"/>
+              </a:ext>
+            </a:extLst>
+          </p:cNvPr>
+          <p:cNvSpPr>
+            <a:spLocks noGrp="1"/>
+          </p:cNvSpPr>
+          <p:nvPr>
+            <p:ph type="title"/>
+          </p:nvPr>
+        </p:nvSpPr>
+        <p:spPr>
+          <a:xfrm>
+            <a:off x="762000" y="762000"/>
+            <a:ext cx="10668000" cy="1524000"/>
+          </a:xfrm>
+        </p:spPr>
+        <p:txBody>
+          <a:bodyPr/>
+          <a:lstStyle/>
+          <a:p>
+            <a:r>
+              <a:rPr lang="de-DE" noProof="0" dirty="0"/>
+              <a:t>3. Produktzwischenstand</a:t>
+            </a:r>
+            <a:endParaRPr lang="de-DE" dirty="0"/>
           </a:p>
         </p:txBody>
       </p:sp>
@@ -10723,6 +10992,111 @@
   <p:clrMapOvr>
     <a:masterClrMapping/>
   </p:clrMapOvr>
+  <p:timing>
+    <p:tnLst>
+      <p:par>
+        <p:cTn id="1" dur="indefinite" restart="never" nodeType="tmRoot">
+          <p:childTnLst>
+            <p:seq concurrent="1" nextAc="seek">
+              <p:cTn id="2" dur="indefinite" nodeType="mainSeq">
+                <p:childTnLst>
+                  <p:par>
+                    <p:cTn id="3" fill="hold">
+                      <p:stCondLst>
+                        <p:cond delay="indefinite"/>
+                      </p:stCondLst>
+                      <p:childTnLst>
+                        <p:par>
+                          <p:cTn id="4" fill="hold">
+                            <p:stCondLst>
+                              <p:cond delay="0"/>
+                            </p:stCondLst>
+                            <p:childTnLst>
+                              <p:par>
+                                <p:cTn id="5" presetID="1" presetClass="entr" presetSubtype="0" fill="hold" nodeType="clickEffect">
+                                  <p:stCondLst>
+                                    <p:cond delay="0"/>
+                                  </p:stCondLst>
+                                  <p:childTnLst>
+                                    <p:set>
+                                      <p:cBhvr>
+                                        <p:cTn id="6" dur="1" fill="hold">
+                                          <p:stCondLst>
+                                            <p:cond delay="0"/>
+                                          </p:stCondLst>
+                                        </p:cTn>
+                                        <p:tgtEl>
+                                          <p:spTgt spid="7"/>
+                                        </p:tgtEl>
+                                        <p:attrNameLst>
+                                          <p:attrName>style.visibility</p:attrName>
+                                        </p:attrNameLst>
+                                      </p:cBhvr>
+                                      <p:to>
+                                        <p:strVal val="visible"/>
+                                      </p:to>
+                                    </p:set>
+                                  </p:childTnLst>
+                                </p:cTn>
+                              </p:par>
+                              <p:par>
+                                <p:cTn id="7" presetID="1" presetClass="entr" presetSubtype="0" fill="hold" grpId="0" nodeType="withEffect">
+                                  <p:stCondLst>
+                                    <p:cond delay="0"/>
+                                  </p:stCondLst>
+                                  <p:childTnLst>
+                                    <p:set>
+                                      <p:cBhvr>
+                                        <p:cTn id="8" dur="1" fill="hold">
+                                          <p:stCondLst>
+                                            <p:cond delay="0"/>
+                                          </p:stCondLst>
+                                        </p:cTn>
+                                        <p:tgtEl>
+                                          <p:spTgt spid="12"/>
+                                        </p:tgtEl>
+                                        <p:attrNameLst>
+                                          <p:attrName>style.visibility</p:attrName>
+                                        </p:attrNameLst>
+                                      </p:cBhvr>
+                                      <p:to>
+                                        <p:strVal val="visible"/>
+                                      </p:to>
+                                    </p:set>
+                                  </p:childTnLst>
+                                </p:cTn>
+                              </p:par>
+                            </p:childTnLst>
+                          </p:cTn>
+                        </p:par>
+                      </p:childTnLst>
+                    </p:cTn>
+                  </p:par>
+                </p:childTnLst>
+              </p:cTn>
+              <p:prevCondLst>
+                <p:cond evt="onPrev" delay="0">
+                  <p:tgtEl>
+                    <p:sldTgt/>
+                  </p:tgtEl>
+                </p:cond>
+              </p:prevCondLst>
+              <p:nextCondLst>
+                <p:cond evt="onNext" delay="0">
+                  <p:tgtEl>
+                    <p:sldTgt/>
+                  </p:tgtEl>
+                </p:cond>
+              </p:nextCondLst>
+            </p:seq>
+          </p:childTnLst>
+        </p:cTn>
+      </p:par>
+    </p:tnLst>
+    <p:bldLst>
+      <p:bldP spid="12" grpId="0" animBg="1"/>
+    </p:bldLst>
+  </p:timing>
 </p:sld>
 </file>
 

</xml_diff>